<commit_message>
need to add arrows to Fig 2
</commit_message>
<xml_diff>
--- a/presentations/Diagrams/manuscript_diagram_placeholder.pptx
+++ b/presentations/Diagrams/manuscript_diagram_placeholder.pptx
@@ -6,9 +6,10 @@
   </p:sldMasterIdLst>
   <p:sldIdLst>
     <p:sldId id="256" r:id="rId2"/>
+    <p:sldId id="257" r:id="rId3"/>
   </p:sldIdLst>
   <p:sldSz cx="12192000" cy="6858000"/>
-  <p:notesSz cx="6858000" cy="9144000"/>
+  <p:notesSz cx="7315200" cy="9601200"/>
   <p:defaultTextStyle>
     <a:defPPr>
       <a:defRPr lang="en-US"/>
@@ -104,6 +105,11 @@
       </a:defRPr>
     </a:lvl9pPr>
   </p:defaultTextStyle>
+  <p:extLst>
+    <p:ext uri="{EFAFB233-063F-42B5-8137-9DF3F51BA10A}">
+      <p15:sldGuideLst xmlns:p15="http://schemas.microsoft.com/office/powerpoint/2012/main"/>
+    </p:ext>
+  </p:extLst>
 </p:presentation>
 </file>
 
@@ -254,7 +260,7 @@
           <a:p>
             <a:fld id="{09AD2A20-D43B-4E33-8EB5-7D3FE41E93B4}" type="datetimeFigureOut">
               <a:rPr lang="en-US" smtClean="0"/>
-              <a:t>2/10/2025</a:t>
+              <a:t>2/18/2025</a:t>
             </a:fld>
             <a:endParaRPr lang="en-US"/>
           </a:p>
@@ -452,7 +458,7 @@
           <a:p>
             <a:fld id="{09AD2A20-D43B-4E33-8EB5-7D3FE41E93B4}" type="datetimeFigureOut">
               <a:rPr lang="en-US" smtClean="0"/>
-              <a:t>2/10/2025</a:t>
+              <a:t>2/18/2025</a:t>
             </a:fld>
             <a:endParaRPr lang="en-US"/>
           </a:p>
@@ -660,7 +666,7 @@
           <a:p>
             <a:fld id="{09AD2A20-D43B-4E33-8EB5-7D3FE41E93B4}" type="datetimeFigureOut">
               <a:rPr lang="en-US" smtClean="0"/>
-              <a:t>2/10/2025</a:t>
+              <a:t>2/18/2025</a:t>
             </a:fld>
             <a:endParaRPr lang="en-US"/>
           </a:p>
@@ -858,7 +864,7 @@
           <a:p>
             <a:fld id="{09AD2A20-D43B-4E33-8EB5-7D3FE41E93B4}" type="datetimeFigureOut">
               <a:rPr lang="en-US" smtClean="0"/>
-              <a:t>2/10/2025</a:t>
+              <a:t>2/18/2025</a:t>
             </a:fld>
             <a:endParaRPr lang="en-US"/>
           </a:p>
@@ -1133,7 +1139,7 @@
           <a:p>
             <a:fld id="{09AD2A20-D43B-4E33-8EB5-7D3FE41E93B4}" type="datetimeFigureOut">
               <a:rPr lang="en-US" smtClean="0"/>
-              <a:t>2/10/2025</a:t>
+              <a:t>2/18/2025</a:t>
             </a:fld>
             <a:endParaRPr lang="en-US"/>
           </a:p>
@@ -1398,7 +1404,7 @@
           <a:p>
             <a:fld id="{09AD2A20-D43B-4E33-8EB5-7D3FE41E93B4}" type="datetimeFigureOut">
               <a:rPr lang="en-US" smtClean="0"/>
-              <a:t>2/10/2025</a:t>
+              <a:t>2/18/2025</a:t>
             </a:fld>
             <a:endParaRPr lang="en-US"/>
           </a:p>
@@ -1810,7 +1816,7 @@
           <a:p>
             <a:fld id="{09AD2A20-D43B-4E33-8EB5-7D3FE41E93B4}" type="datetimeFigureOut">
               <a:rPr lang="en-US" smtClean="0"/>
-              <a:t>2/10/2025</a:t>
+              <a:t>2/18/2025</a:t>
             </a:fld>
             <a:endParaRPr lang="en-US"/>
           </a:p>
@@ -1951,7 +1957,7 @@
           <a:p>
             <a:fld id="{09AD2A20-D43B-4E33-8EB5-7D3FE41E93B4}" type="datetimeFigureOut">
               <a:rPr lang="en-US" smtClean="0"/>
-              <a:t>2/10/2025</a:t>
+              <a:t>2/18/2025</a:t>
             </a:fld>
             <a:endParaRPr lang="en-US"/>
           </a:p>
@@ -2064,7 +2070,7 @@
           <a:p>
             <a:fld id="{09AD2A20-D43B-4E33-8EB5-7D3FE41E93B4}" type="datetimeFigureOut">
               <a:rPr lang="en-US" smtClean="0"/>
-              <a:t>2/10/2025</a:t>
+              <a:t>2/18/2025</a:t>
             </a:fld>
             <a:endParaRPr lang="en-US"/>
           </a:p>
@@ -2375,7 +2381,7 @@
           <a:p>
             <a:fld id="{09AD2A20-D43B-4E33-8EB5-7D3FE41E93B4}" type="datetimeFigureOut">
               <a:rPr lang="en-US" smtClean="0"/>
-              <a:t>2/10/2025</a:t>
+              <a:t>2/18/2025</a:t>
             </a:fld>
             <a:endParaRPr lang="en-US"/>
           </a:p>
@@ -2663,7 +2669,7 @@
           <a:p>
             <a:fld id="{09AD2A20-D43B-4E33-8EB5-7D3FE41E93B4}" type="datetimeFigureOut">
               <a:rPr lang="en-US" smtClean="0"/>
-              <a:t>2/10/2025</a:t>
+              <a:t>2/18/2025</a:t>
             </a:fld>
             <a:endParaRPr lang="en-US"/>
           </a:p>
@@ -2904,7 +2910,7 @@
           <a:p>
             <a:fld id="{09AD2A20-D43B-4E33-8EB5-7D3FE41E93B4}" type="datetimeFigureOut">
               <a:rPr lang="en-US" smtClean="0"/>
-              <a:t>2/10/2025</a:t>
+              <a:t>2/18/2025</a:t>
             </a:fld>
             <a:endParaRPr lang="en-US"/>
           </a:p>
@@ -3321,44 +3327,161 @@
           <a:chExt cx="0" cy="0"/>
         </a:xfrm>
       </p:grpSpPr>
+      <p:sp>
+        <p:nvSpPr>
+          <p:cNvPr id="235" name="Rectangle 234">
+            <a:extLst>
+              <a:ext uri="{FF2B5EF4-FFF2-40B4-BE49-F238E27FC236}">
+                <a16:creationId xmlns:a16="http://schemas.microsoft.com/office/drawing/2014/main" id="{76F9F943-D3B5-F846-1D68-F283BFCCE966}"/>
+              </a:ext>
+            </a:extLst>
+          </p:cNvPr>
+          <p:cNvSpPr>
+            <a:spLocks/>
+          </p:cNvSpPr>
+          <p:nvPr/>
+        </p:nvSpPr>
+        <p:spPr>
+          <a:xfrm>
+            <a:off x="29124" y="28446"/>
+            <a:ext cx="11478796" cy="2924753"/>
+          </a:xfrm>
+          <a:prstGeom prst="rect">
+            <a:avLst/>
+          </a:prstGeom>
+          <a:noFill/>
+          <a:ln w="38100">
+            <a:solidFill>
+              <a:schemeClr val="bg2">
+                <a:lumMod val="90000"/>
+              </a:schemeClr>
+            </a:solidFill>
+            <a:prstDash val="sysDash"/>
+          </a:ln>
+        </p:spPr>
+        <p:style>
+          <a:lnRef idx="2">
+            <a:schemeClr val="accent1">
+              <a:shade val="15000"/>
+            </a:schemeClr>
+          </a:lnRef>
+          <a:fillRef idx="1">
+            <a:schemeClr val="accent1"/>
+          </a:fillRef>
+          <a:effectRef idx="0">
+            <a:schemeClr val="accent1"/>
+          </a:effectRef>
+          <a:fontRef idx="minor">
+            <a:schemeClr val="lt1"/>
+          </a:fontRef>
+        </p:style>
+        <p:txBody>
+          <a:bodyPr rtlCol="0" anchor="ctr"/>
+          <a:lstStyle/>
+          <a:p>
+            <a:pPr algn="ctr"/>
+            <a:endParaRPr lang="en-US"/>
+          </a:p>
+        </p:txBody>
+      </p:sp>
+      <p:sp>
+        <p:nvSpPr>
+          <p:cNvPr id="232" name="Rectangle 231">
+            <a:extLst>
+              <a:ext uri="{FF2B5EF4-FFF2-40B4-BE49-F238E27FC236}">
+                <a16:creationId xmlns:a16="http://schemas.microsoft.com/office/drawing/2014/main" id="{BE7086B2-3D76-8184-E6C0-8C46301A4519}"/>
+              </a:ext>
+            </a:extLst>
+          </p:cNvPr>
+          <p:cNvSpPr>
+            <a:spLocks/>
+          </p:cNvSpPr>
+          <p:nvPr/>
+        </p:nvSpPr>
+        <p:spPr>
+          <a:xfrm>
+            <a:off x="29124" y="3131274"/>
+            <a:ext cx="11478798" cy="1386751"/>
+          </a:xfrm>
+          <a:prstGeom prst="rect">
+            <a:avLst/>
+          </a:prstGeom>
+          <a:noFill/>
+          <a:ln w="38100">
+            <a:solidFill>
+              <a:schemeClr val="bg2">
+                <a:lumMod val="90000"/>
+              </a:schemeClr>
+            </a:solidFill>
+            <a:prstDash val="sysDash"/>
+          </a:ln>
+        </p:spPr>
+        <p:style>
+          <a:lnRef idx="2">
+            <a:schemeClr val="accent1">
+              <a:shade val="15000"/>
+            </a:schemeClr>
+          </a:lnRef>
+          <a:fillRef idx="1">
+            <a:schemeClr val="accent1"/>
+          </a:fillRef>
+          <a:effectRef idx="0">
+            <a:schemeClr val="accent1"/>
+          </a:effectRef>
+          <a:fontRef idx="minor">
+            <a:schemeClr val="lt1"/>
+          </a:fontRef>
+        </p:style>
+        <p:txBody>
+          <a:bodyPr rtlCol="0" anchor="ctr"/>
+          <a:lstStyle/>
+          <a:p>
+            <a:pPr algn="ctr"/>
+            <a:endParaRPr lang="en-US" dirty="0"/>
+          </a:p>
+        </p:txBody>
+      </p:sp>
       <p:cxnSp>
         <p:nvCxnSpPr>
-          <p:cNvPr id="184" name="Connector: Elbow 183">
-            <a:extLst>
-              <a:ext uri="{FF2B5EF4-FFF2-40B4-BE49-F238E27FC236}">
-                <a16:creationId xmlns:a16="http://schemas.microsoft.com/office/drawing/2014/main" id="{0C32BFCE-AD96-32C0-3A36-6A0693B6DC2C}"/>
+          <p:cNvPr id="233" name="Connector: Curved 232">
+            <a:extLst>
+              <a:ext uri="{FF2B5EF4-FFF2-40B4-BE49-F238E27FC236}">
+                <a16:creationId xmlns:a16="http://schemas.microsoft.com/office/drawing/2014/main" id="{06270162-9881-9D84-A33B-1A601F53E7CC}"/>
               </a:ext>
             </a:extLst>
           </p:cNvPr>
           <p:cNvCxnSpPr>
             <a:cxnSpLocks/>
-            <a:endCxn id="192" idx="2"/>
           </p:cNvCxnSpPr>
           <p:nvPr/>
         </p:nvCxnSpPr>
         <p:spPr>
-          <a:xfrm rot="10800000">
-            <a:off x="3029759" y="3926358"/>
-            <a:ext cx="1802406" cy="650938"/>
+          <a:xfrm rot="16200000" flipV="1">
+            <a:off x="4491738" y="2261405"/>
+            <a:ext cx="548522" cy="2005804"/>
           </a:xfrm>
-          <a:prstGeom prst="bentConnector2">
-            <a:avLst/>
+          <a:prstGeom prst="curvedConnector3">
+            <a:avLst>
+              <a:gd name="adj1" fmla="val 50000"/>
+            </a:avLst>
           </a:prstGeom>
-          <a:ln w="38100">
+          <a:ln w="82550" cmpd="sng">
             <a:solidFill>
-              <a:srgbClr val="0F7BA2"/>
+              <a:schemeClr val="bg1"/>
             </a:solidFill>
-            <a:tailEnd type="triangle"/>
+            <a:prstDash val="solid"/>
+            <a:round/>
+            <a:tailEnd type="none"/>
           </a:ln>
         </p:spPr>
         <p:style>
-          <a:lnRef idx="1">
+          <a:lnRef idx="2">
             <a:schemeClr val="accent1"/>
           </a:lnRef>
           <a:fillRef idx="0">
             <a:schemeClr val="accent1"/>
           </a:fillRef>
-          <a:effectRef idx="0">
+          <a:effectRef idx="1">
             <a:schemeClr val="accent1"/>
           </a:effectRef>
           <a:fontRef idx="minor">
@@ -3368,23 +3491,1441 @@
       </p:cxnSp>
       <p:cxnSp>
         <p:nvCxnSpPr>
-          <p:cNvPr id="163" name="Connector: Elbow 162">
-            <a:extLst>
-              <a:ext uri="{FF2B5EF4-FFF2-40B4-BE49-F238E27FC236}">
-                <a16:creationId xmlns:a16="http://schemas.microsoft.com/office/drawing/2014/main" id="{DC0D23B0-1D74-772D-B872-CE48DB3670B4}"/>
+          <p:cNvPr id="234" name="Connector: Curved 233">
+            <a:extLst>
+              <a:ext uri="{FF2B5EF4-FFF2-40B4-BE49-F238E27FC236}">
+                <a16:creationId xmlns:a16="http://schemas.microsoft.com/office/drawing/2014/main" id="{26B44527-E4C1-B8E0-3DA2-18BB349EB44A}"/>
               </a:ext>
             </a:extLst>
           </p:cNvPr>
           <p:cNvCxnSpPr>
             <a:cxnSpLocks/>
-            <a:endCxn id="208" idx="2"/>
           </p:cNvCxnSpPr>
           <p:nvPr/>
         </p:nvCxnSpPr>
         <p:spPr>
           <a:xfrm rot="10800000">
-            <a:off x="901989" y="2886531"/>
-            <a:ext cx="1857808" cy="708640"/>
+            <a:off x="3763097" y="2411884"/>
+            <a:ext cx="12700" cy="578163"/>
+          </a:xfrm>
+          <a:prstGeom prst="curvedConnector2">
+            <a:avLst/>
+          </a:prstGeom>
+          <a:ln w="82550" cmpd="sng">
+            <a:solidFill>
+              <a:schemeClr val="bg1"/>
+            </a:solidFill>
+            <a:prstDash val="solid"/>
+            <a:round/>
+            <a:tailEnd type="diamond"/>
+          </a:ln>
+        </p:spPr>
+        <p:style>
+          <a:lnRef idx="2">
+            <a:schemeClr val="accent1"/>
+          </a:lnRef>
+          <a:fillRef idx="0">
+            <a:schemeClr val="accent1"/>
+          </a:fillRef>
+          <a:effectRef idx="1">
+            <a:schemeClr val="accent1"/>
+          </a:effectRef>
+          <a:fontRef idx="minor">
+            <a:schemeClr val="tx1"/>
+          </a:fontRef>
+        </p:style>
+      </p:cxnSp>
+      <p:pic>
+        <p:nvPicPr>
+          <p:cNvPr id="236" name="Picture 51">
+            <a:extLst>
+              <a:ext uri="{FF2B5EF4-FFF2-40B4-BE49-F238E27FC236}">
+                <a16:creationId xmlns:a16="http://schemas.microsoft.com/office/drawing/2014/main" id="{9DD82182-E8BE-63B5-89C0-3EB42CA1E53C}"/>
+              </a:ext>
+            </a:extLst>
+          </p:cNvPr>
+          <p:cNvPicPr>
+            <a:picLocks noChangeAspect="1"/>
+          </p:cNvPicPr>
+          <p:nvPr/>
+        </p:nvPicPr>
+        <p:blipFill>
+          <a:blip r:embed="rId2">
+            <a:extLst>
+              <a:ext uri="{96DAC541-7B7A-43D3-8B79-37D633B846F1}">
+                <asvg:svgBlip xmlns:asvg="http://schemas.microsoft.com/office/drawing/2016/SVG/main" r:embed="rId3"/>
+              </a:ext>
+            </a:extLst>
+          </a:blip>
+          <a:srcRect/>
+          <a:stretch/>
+        </p:blipFill>
+        <p:spPr>
+          <a:xfrm>
+            <a:off x="4450956" y="902787"/>
+            <a:ext cx="2634522" cy="1707974"/>
+          </a:xfrm>
+          <a:prstGeom prst="rect">
+            <a:avLst/>
+          </a:prstGeom>
+        </p:spPr>
+      </p:pic>
+      <p:cxnSp>
+        <p:nvCxnSpPr>
+          <p:cNvPr id="237" name="Connector: Curved 236">
+            <a:extLst>
+              <a:ext uri="{FF2B5EF4-FFF2-40B4-BE49-F238E27FC236}">
+                <a16:creationId xmlns:a16="http://schemas.microsoft.com/office/drawing/2014/main" id="{B0D18EC4-F4C8-AF37-AC27-7D563CC9145B}"/>
+              </a:ext>
+            </a:extLst>
+          </p:cNvPr>
+          <p:cNvCxnSpPr>
+            <a:cxnSpLocks/>
+            <a:stCxn id="238" idx="0"/>
+          </p:cNvCxnSpPr>
+          <p:nvPr/>
+        </p:nvCxnSpPr>
+        <p:spPr>
+          <a:xfrm rot="16200000" flipV="1">
+            <a:off x="4517194" y="2287305"/>
+            <a:ext cx="510422" cy="1993218"/>
+          </a:xfrm>
+          <a:prstGeom prst="curvedConnector3">
+            <a:avLst>
+              <a:gd name="adj1" fmla="val 50000"/>
+            </a:avLst>
+          </a:prstGeom>
+          <a:ln w="76200" cmpd="dbl">
+            <a:solidFill>
+              <a:srgbClr val="994F87"/>
+            </a:solidFill>
+            <a:prstDash val="solid"/>
+            <a:round/>
+            <a:tailEnd type="none"/>
+          </a:ln>
+        </p:spPr>
+        <p:style>
+          <a:lnRef idx="2">
+            <a:schemeClr val="accent1"/>
+          </a:lnRef>
+          <a:fillRef idx="0">
+            <a:schemeClr val="accent1"/>
+          </a:fillRef>
+          <a:effectRef idx="1">
+            <a:schemeClr val="accent1"/>
+          </a:effectRef>
+          <a:fontRef idx="minor">
+            <a:schemeClr val="tx1"/>
+          </a:fontRef>
+        </p:style>
+      </p:cxnSp>
+      <p:sp>
+        <p:nvSpPr>
+          <p:cNvPr id="238" name="Rectangle: Rounded Corners 237">
+            <a:extLst>
+              <a:ext uri="{FF2B5EF4-FFF2-40B4-BE49-F238E27FC236}">
+                <a16:creationId xmlns:a16="http://schemas.microsoft.com/office/drawing/2014/main" id="{4F41CD84-E1D1-C7EA-3FED-0CBEB77A3429}"/>
+              </a:ext>
+            </a:extLst>
+          </p:cNvPr>
+          <p:cNvSpPr>
+            <a:spLocks/>
+          </p:cNvSpPr>
+          <p:nvPr/>
+        </p:nvSpPr>
+        <p:spPr>
+          <a:xfrm>
+            <a:off x="4214534" y="3539125"/>
+            <a:ext cx="3108960" cy="822960"/>
+          </a:xfrm>
+          <a:prstGeom prst="roundRect">
+            <a:avLst/>
+          </a:prstGeom>
+          <a:solidFill>
+            <a:schemeClr val="bg1"/>
+          </a:solidFill>
+          <a:ln w="38100">
+            <a:solidFill>
+              <a:srgbClr val="E73E74"/>
+            </a:solidFill>
+          </a:ln>
+        </p:spPr>
+        <p:style>
+          <a:lnRef idx="2">
+            <a:schemeClr val="accent1">
+              <a:shade val="15000"/>
+            </a:schemeClr>
+          </a:lnRef>
+          <a:fillRef idx="1">
+            <a:schemeClr val="accent1"/>
+          </a:fillRef>
+          <a:effectRef idx="0">
+            <a:schemeClr val="accent1"/>
+          </a:effectRef>
+          <a:fontRef idx="minor">
+            <a:schemeClr val="lt1"/>
+          </a:fontRef>
+        </p:style>
+        <p:txBody>
+          <a:bodyPr rtlCol="0" anchor="ctr"/>
+          <a:lstStyle/>
+          <a:p>
+            <a:pPr algn="ctr"/>
+            <a:r>
+              <a:rPr lang="en-US" sz="2000" b="1" dirty="0">
+                <a:solidFill>
+                  <a:sysClr val="windowText" lastClr="000000"/>
+                </a:solidFill>
+              </a:rPr>
+              <a:t>Infected</a:t>
+            </a:r>
+          </a:p>
+        </p:txBody>
+      </p:sp>
+      <p:sp>
+        <p:nvSpPr>
+          <p:cNvPr id="239" name="Rectangle: Rounded Corners 238">
+            <a:extLst>
+              <a:ext uri="{FF2B5EF4-FFF2-40B4-BE49-F238E27FC236}">
+                <a16:creationId xmlns:a16="http://schemas.microsoft.com/office/drawing/2014/main" id="{107EEB90-388E-AB5F-B5ED-CB252DED028D}"/>
+              </a:ext>
+            </a:extLst>
+          </p:cNvPr>
+          <p:cNvSpPr>
+            <a:spLocks/>
+          </p:cNvSpPr>
+          <p:nvPr/>
+        </p:nvSpPr>
+        <p:spPr>
+          <a:xfrm>
+            <a:off x="8235956" y="3539125"/>
+            <a:ext cx="3108960" cy="822960"/>
+          </a:xfrm>
+          <a:prstGeom prst="roundRect">
+            <a:avLst/>
+          </a:prstGeom>
+          <a:solidFill>
+            <a:schemeClr val="bg1"/>
+          </a:solidFill>
+          <a:ln w="38100">
+            <a:solidFill>
+              <a:srgbClr val="1671B1"/>
+            </a:solidFill>
+          </a:ln>
+        </p:spPr>
+        <p:style>
+          <a:lnRef idx="2">
+            <a:schemeClr val="accent1">
+              <a:shade val="15000"/>
+            </a:schemeClr>
+          </a:lnRef>
+          <a:fillRef idx="1">
+            <a:schemeClr val="accent1"/>
+          </a:fillRef>
+          <a:effectRef idx="0">
+            <a:schemeClr val="accent1"/>
+          </a:effectRef>
+          <a:fontRef idx="minor">
+            <a:schemeClr val="lt1"/>
+          </a:fontRef>
+        </p:style>
+        <p:txBody>
+          <a:bodyPr rtlCol="0" anchor="ctr"/>
+          <a:lstStyle/>
+          <a:p>
+            <a:pPr algn="ctr"/>
+            <a:r>
+              <a:rPr lang="en-US" sz="2000" b="1" dirty="0">
+                <a:solidFill>
+                  <a:sysClr val="windowText" lastClr="000000"/>
+                </a:solidFill>
+              </a:rPr>
+              <a:t>Susceptible</a:t>
+            </a:r>
+          </a:p>
+        </p:txBody>
+      </p:sp>
+      <p:cxnSp>
+        <p:nvCxnSpPr>
+          <p:cNvPr id="240" name="Straight Arrow Connector 239">
+            <a:extLst>
+              <a:ext uri="{FF2B5EF4-FFF2-40B4-BE49-F238E27FC236}">
+                <a16:creationId xmlns:a16="http://schemas.microsoft.com/office/drawing/2014/main" id="{3C4744F5-7AA3-BDDD-C5DD-3852F6BDCE50}"/>
+              </a:ext>
+            </a:extLst>
+          </p:cNvPr>
+          <p:cNvCxnSpPr>
+            <a:cxnSpLocks/>
+          </p:cNvCxnSpPr>
+          <p:nvPr/>
+        </p:nvCxnSpPr>
+        <p:spPr>
+          <a:xfrm flipH="1">
+            <a:off x="6290565" y="3944385"/>
+            <a:ext cx="2743200" cy="15542"/>
+          </a:xfrm>
+          <a:prstGeom prst="straightConnector1">
+            <a:avLst/>
+          </a:prstGeom>
+          <a:ln w="76200">
+            <a:solidFill>
+              <a:srgbClr val="E73E74"/>
+            </a:solidFill>
+            <a:tailEnd type="triangle" w="sm" len="med"/>
+          </a:ln>
+        </p:spPr>
+        <p:style>
+          <a:lnRef idx="2">
+            <a:schemeClr val="accent1"/>
+          </a:lnRef>
+          <a:fillRef idx="0">
+            <a:schemeClr val="accent1"/>
+          </a:fillRef>
+          <a:effectRef idx="1">
+            <a:schemeClr val="accent1"/>
+          </a:effectRef>
+          <a:fontRef idx="minor">
+            <a:schemeClr val="tx1"/>
+          </a:fontRef>
+        </p:style>
+      </p:cxnSp>
+      <p:sp>
+        <p:nvSpPr>
+          <p:cNvPr id="241" name="Rectangle: Rounded Corners 240">
+            <a:extLst>
+              <a:ext uri="{FF2B5EF4-FFF2-40B4-BE49-F238E27FC236}">
+                <a16:creationId xmlns:a16="http://schemas.microsoft.com/office/drawing/2014/main" id="{AD3DED02-2081-DE32-59D3-F66B0163850C}"/>
+              </a:ext>
+            </a:extLst>
+          </p:cNvPr>
+          <p:cNvSpPr>
+            <a:spLocks/>
+          </p:cNvSpPr>
+          <p:nvPr/>
+        </p:nvSpPr>
+        <p:spPr>
+          <a:xfrm>
+            <a:off x="193925" y="3554667"/>
+            <a:ext cx="3108960" cy="822960"/>
+          </a:xfrm>
+          <a:prstGeom prst="roundRect">
+            <a:avLst/>
+          </a:prstGeom>
+          <a:solidFill>
+            <a:schemeClr val="bg1"/>
+          </a:solidFill>
+          <a:ln w="38100">
+            <a:solidFill>
+              <a:srgbClr val="6699CC"/>
+            </a:solidFill>
+          </a:ln>
+        </p:spPr>
+        <p:style>
+          <a:lnRef idx="2">
+            <a:schemeClr val="accent1">
+              <a:shade val="15000"/>
+            </a:schemeClr>
+          </a:lnRef>
+          <a:fillRef idx="1">
+            <a:schemeClr val="accent1"/>
+          </a:fillRef>
+          <a:effectRef idx="0">
+            <a:schemeClr val="accent1"/>
+          </a:effectRef>
+          <a:fontRef idx="minor">
+            <a:schemeClr val="lt1"/>
+          </a:fontRef>
+        </p:style>
+        <p:txBody>
+          <a:bodyPr rtlCol="0" anchor="ctr"/>
+          <a:lstStyle/>
+          <a:p>
+            <a:pPr algn="ctr"/>
+            <a:r>
+              <a:rPr lang="en-US" sz="2000" b="1" dirty="0">
+                <a:solidFill>
+                  <a:sysClr val="windowText" lastClr="000000"/>
+                </a:solidFill>
+              </a:rPr>
+              <a:t>Recovered</a:t>
+            </a:r>
+          </a:p>
+        </p:txBody>
+      </p:sp>
+      <p:cxnSp>
+        <p:nvCxnSpPr>
+          <p:cNvPr id="242" name="Straight Arrow Connector 241">
+            <a:extLst>
+              <a:ext uri="{FF2B5EF4-FFF2-40B4-BE49-F238E27FC236}">
+                <a16:creationId xmlns:a16="http://schemas.microsoft.com/office/drawing/2014/main" id="{D1CBC27F-DA9D-3025-3303-0D88CCD0574A}"/>
+              </a:ext>
+            </a:extLst>
+          </p:cNvPr>
+          <p:cNvCxnSpPr>
+            <a:cxnSpLocks/>
+          </p:cNvCxnSpPr>
+          <p:nvPr/>
+        </p:nvCxnSpPr>
+        <p:spPr>
+          <a:xfrm flipH="1">
+            <a:off x="2417506" y="3944385"/>
+            <a:ext cx="2743200" cy="15542"/>
+          </a:xfrm>
+          <a:prstGeom prst="straightConnector1">
+            <a:avLst/>
+          </a:prstGeom>
+          <a:ln w="76200">
+            <a:solidFill>
+              <a:srgbClr val="6699CC"/>
+            </a:solidFill>
+            <a:tailEnd type="triangle" w="sm" len="med"/>
+          </a:ln>
+        </p:spPr>
+        <p:style>
+          <a:lnRef idx="2">
+            <a:schemeClr val="accent1"/>
+          </a:lnRef>
+          <a:fillRef idx="0">
+            <a:schemeClr val="accent1"/>
+          </a:fillRef>
+          <a:effectRef idx="1">
+            <a:schemeClr val="accent1"/>
+          </a:effectRef>
+          <a:fontRef idx="minor">
+            <a:schemeClr val="tx1"/>
+          </a:fontRef>
+        </p:style>
+      </p:cxnSp>
+      <p:sp>
+        <p:nvSpPr>
+          <p:cNvPr id="243" name="Rectangle: Rounded Corners 242">
+            <a:extLst>
+              <a:ext uri="{FF2B5EF4-FFF2-40B4-BE49-F238E27FC236}">
+                <a16:creationId xmlns:a16="http://schemas.microsoft.com/office/drawing/2014/main" id="{76F6C0A8-0F25-5FA1-5345-70C2D054EC63}"/>
+              </a:ext>
+            </a:extLst>
+          </p:cNvPr>
+          <p:cNvSpPr>
+            <a:spLocks/>
+          </p:cNvSpPr>
+          <p:nvPr/>
+        </p:nvSpPr>
+        <p:spPr>
+          <a:xfrm>
+            <a:off x="193925" y="438860"/>
+            <a:ext cx="3108960" cy="2377440"/>
+          </a:xfrm>
+          <a:prstGeom prst="roundRect">
+            <a:avLst/>
+          </a:prstGeom>
+          <a:noFill/>
+          <a:ln w="38100">
+            <a:solidFill>
+              <a:srgbClr val="1671B1"/>
+            </a:solidFill>
+          </a:ln>
+        </p:spPr>
+        <p:style>
+          <a:lnRef idx="2">
+            <a:schemeClr val="accent1">
+              <a:shade val="15000"/>
+            </a:schemeClr>
+          </a:lnRef>
+          <a:fillRef idx="1">
+            <a:schemeClr val="accent1"/>
+          </a:fillRef>
+          <a:effectRef idx="0">
+            <a:schemeClr val="accent1"/>
+          </a:effectRef>
+          <a:fontRef idx="minor">
+            <a:schemeClr val="lt1"/>
+          </a:fontRef>
+        </p:style>
+        <p:txBody>
+          <a:bodyPr rtlCol="0" anchor="t"/>
+          <a:lstStyle/>
+          <a:p>
+            <a:pPr algn="ctr"/>
+            <a:r>
+              <a:rPr lang="en-US" sz="2000" b="1" dirty="0">
+                <a:solidFill>
+                  <a:schemeClr val="tx1"/>
+                </a:solidFill>
+              </a:rPr>
+              <a:t>Susceptible</a:t>
+            </a:r>
+          </a:p>
+        </p:txBody>
+      </p:sp>
+      <p:sp>
+        <p:nvSpPr>
+          <p:cNvPr id="244" name="Rectangle: Rounded Corners 243">
+            <a:extLst>
+              <a:ext uri="{FF2B5EF4-FFF2-40B4-BE49-F238E27FC236}">
+                <a16:creationId xmlns:a16="http://schemas.microsoft.com/office/drawing/2014/main" id="{59F15342-CBC6-0716-6FD4-CE648E49AE28}"/>
+              </a:ext>
+            </a:extLst>
+          </p:cNvPr>
+          <p:cNvSpPr>
+            <a:spLocks/>
+          </p:cNvSpPr>
+          <p:nvPr/>
+        </p:nvSpPr>
+        <p:spPr>
+          <a:xfrm>
+            <a:off x="4214534" y="441960"/>
+            <a:ext cx="3108960" cy="2377440"/>
+          </a:xfrm>
+          <a:prstGeom prst="roundRect">
+            <a:avLst/>
+          </a:prstGeom>
+          <a:noFill/>
+          <a:ln w="38100">
+            <a:solidFill>
+              <a:srgbClr val="2C9F2C"/>
+            </a:solidFill>
+          </a:ln>
+        </p:spPr>
+        <p:style>
+          <a:lnRef idx="2">
+            <a:schemeClr val="accent1">
+              <a:shade val="15000"/>
+            </a:schemeClr>
+          </a:lnRef>
+          <a:fillRef idx="1">
+            <a:schemeClr val="accent1"/>
+          </a:fillRef>
+          <a:effectRef idx="0">
+            <a:schemeClr val="accent1"/>
+          </a:effectRef>
+          <a:fontRef idx="minor">
+            <a:schemeClr val="lt1"/>
+          </a:fontRef>
+        </p:style>
+        <p:txBody>
+          <a:bodyPr rtlCol="0" anchor="t"/>
+          <a:lstStyle/>
+          <a:p>
+            <a:pPr algn="ctr"/>
+            <a:r>
+              <a:rPr lang="en-US" sz="2000" b="1" dirty="0">
+                <a:solidFill>
+                  <a:schemeClr val="tx1"/>
+                </a:solidFill>
+              </a:rPr>
+              <a:t>Exposed</a:t>
+            </a:r>
+          </a:p>
+        </p:txBody>
+      </p:sp>
+      <p:sp>
+        <p:nvSpPr>
+          <p:cNvPr id="245" name="TextBox 244">
+            <a:extLst>
+              <a:ext uri="{FF2B5EF4-FFF2-40B4-BE49-F238E27FC236}">
+                <a16:creationId xmlns:a16="http://schemas.microsoft.com/office/drawing/2014/main" id="{88C9D669-ADCA-521E-6D8A-AEDFCA0D9842}"/>
+              </a:ext>
+            </a:extLst>
+          </p:cNvPr>
+          <p:cNvSpPr txBox="1">
+            <a:spLocks/>
+          </p:cNvSpPr>
+          <p:nvPr/>
+        </p:nvSpPr>
+        <p:spPr>
+          <a:xfrm>
+            <a:off x="30718" y="-18180"/>
+            <a:ext cx="3564566" cy="523220"/>
+          </a:xfrm>
+          <a:prstGeom prst="rect">
+            <a:avLst/>
+          </a:prstGeom>
+          <a:noFill/>
+        </p:spPr>
+        <p:txBody>
+          <a:bodyPr wrap="none" rtlCol="0">
+            <a:spAutoFit/>
+          </a:bodyPr>
+          <a:lstStyle/>
+          <a:p>
+            <a:r>
+              <a:rPr lang="en-US" sz="2800" b="1" dirty="0"/>
+              <a:t>Mosquito population</a:t>
+            </a:r>
+          </a:p>
+        </p:txBody>
+      </p:sp>
+      <p:sp>
+        <p:nvSpPr>
+          <p:cNvPr id="247" name="Rectangle: Rounded Corners 246">
+            <a:extLst>
+              <a:ext uri="{FF2B5EF4-FFF2-40B4-BE49-F238E27FC236}">
+                <a16:creationId xmlns:a16="http://schemas.microsoft.com/office/drawing/2014/main" id="{B2804F72-B4D8-9631-F8C1-874E1A64BB36}"/>
+              </a:ext>
+            </a:extLst>
+          </p:cNvPr>
+          <p:cNvSpPr>
+            <a:spLocks/>
+          </p:cNvSpPr>
+          <p:nvPr/>
+        </p:nvSpPr>
+        <p:spPr>
+          <a:xfrm>
+            <a:off x="8235956" y="435510"/>
+            <a:ext cx="3108960" cy="2377440"/>
+          </a:xfrm>
+          <a:prstGeom prst="roundRect">
+            <a:avLst/>
+          </a:prstGeom>
+          <a:noFill/>
+          <a:ln w="38100">
+            <a:solidFill>
+              <a:srgbClr val="E73E74"/>
+            </a:solidFill>
+          </a:ln>
+        </p:spPr>
+        <p:style>
+          <a:lnRef idx="2">
+            <a:schemeClr val="accent1">
+              <a:shade val="15000"/>
+            </a:schemeClr>
+          </a:lnRef>
+          <a:fillRef idx="1">
+            <a:schemeClr val="accent1"/>
+          </a:fillRef>
+          <a:effectRef idx="0">
+            <a:schemeClr val="accent1"/>
+          </a:effectRef>
+          <a:fontRef idx="minor">
+            <a:schemeClr val="lt1"/>
+          </a:fontRef>
+        </p:style>
+        <p:txBody>
+          <a:bodyPr rtlCol="0" anchor="t"/>
+          <a:lstStyle/>
+          <a:p>
+            <a:pPr algn="ctr"/>
+            <a:r>
+              <a:rPr lang="en-US" sz="2000" b="1" dirty="0">
+                <a:solidFill>
+                  <a:schemeClr val="tx1"/>
+                </a:solidFill>
+              </a:rPr>
+              <a:t>Infectious</a:t>
+            </a:r>
+          </a:p>
+        </p:txBody>
+      </p:sp>
+      <p:cxnSp>
+        <p:nvCxnSpPr>
+          <p:cNvPr id="249" name="Straight Arrow Connector 248">
+            <a:extLst>
+              <a:ext uri="{FF2B5EF4-FFF2-40B4-BE49-F238E27FC236}">
+                <a16:creationId xmlns:a16="http://schemas.microsoft.com/office/drawing/2014/main" id="{5BE19125-AD75-9F9E-3A00-2DB98DD35E73}"/>
+              </a:ext>
+            </a:extLst>
+          </p:cNvPr>
+          <p:cNvCxnSpPr>
+            <a:cxnSpLocks/>
+          </p:cNvCxnSpPr>
+          <p:nvPr/>
+        </p:nvCxnSpPr>
+        <p:spPr>
+          <a:xfrm>
+            <a:off x="6989810" y="987518"/>
+            <a:ext cx="3327035" cy="0"/>
+          </a:xfrm>
+          <a:prstGeom prst="straightConnector1">
+            <a:avLst/>
+          </a:prstGeom>
+          <a:ln w="76200">
+            <a:solidFill>
+              <a:srgbClr val="E73E74"/>
+            </a:solidFill>
+            <a:tailEnd type="triangle" w="sm" len="med"/>
+          </a:ln>
+        </p:spPr>
+        <p:style>
+          <a:lnRef idx="2">
+            <a:schemeClr val="accent1"/>
+          </a:lnRef>
+          <a:fillRef idx="0">
+            <a:schemeClr val="accent1"/>
+          </a:fillRef>
+          <a:effectRef idx="1">
+            <a:schemeClr val="accent1"/>
+          </a:effectRef>
+          <a:fontRef idx="minor">
+            <a:schemeClr val="tx1"/>
+          </a:fontRef>
+        </p:style>
+      </p:cxnSp>
+      <p:cxnSp>
+        <p:nvCxnSpPr>
+          <p:cNvPr id="250" name="Straight Arrow Connector 249">
+            <a:extLst>
+              <a:ext uri="{FF2B5EF4-FFF2-40B4-BE49-F238E27FC236}">
+                <a16:creationId xmlns:a16="http://schemas.microsoft.com/office/drawing/2014/main" id="{8F5FFD4F-B1AC-BB30-7B16-F5CC700413DA}"/>
+              </a:ext>
+            </a:extLst>
+          </p:cNvPr>
+          <p:cNvCxnSpPr>
+            <a:cxnSpLocks/>
+          </p:cNvCxnSpPr>
+          <p:nvPr/>
+        </p:nvCxnSpPr>
+        <p:spPr>
+          <a:xfrm>
+            <a:off x="5458869" y="2271139"/>
+            <a:ext cx="3253218" cy="0"/>
+          </a:xfrm>
+          <a:prstGeom prst="straightConnector1">
+            <a:avLst/>
+          </a:prstGeom>
+          <a:ln w="76200">
+            <a:solidFill>
+              <a:srgbClr val="E73E74"/>
+            </a:solidFill>
+            <a:tailEnd type="triangle" w="sm" len="med"/>
+          </a:ln>
+        </p:spPr>
+        <p:style>
+          <a:lnRef idx="2">
+            <a:schemeClr val="accent1"/>
+          </a:lnRef>
+          <a:fillRef idx="0">
+            <a:schemeClr val="accent1"/>
+          </a:fillRef>
+          <a:effectRef idx="1">
+            <a:schemeClr val="accent1"/>
+          </a:effectRef>
+          <a:fontRef idx="minor">
+            <a:schemeClr val="tx1"/>
+          </a:fontRef>
+        </p:style>
+      </p:cxnSp>
+      <p:cxnSp>
+        <p:nvCxnSpPr>
+          <p:cNvPr id="252" name="Connector: Curved 251">
+            <a:extLst>
+              <a:ext uri="{FF2B5EF4-FFF2-40B4-BE49-F238E27FC236}">
+                <a16:creationId xmlns:a16="http://schemas.microsoft.com/office/drawing/2014/main" id="{1F1082F9-0444-A12F-97BC-D0ECF55F9C6D}"/>
+              </a:ext>
+            </a:extLst>
+          </p:cNvPr>
+          <p:cNvCxnSpPr>
+            <a:cxnSpLocks/>
+          </p:cNvCxnSpPr>
+          <p:nvPr/>
+        </p:nvCxnSpPr>
+        <p:spPr>
+          <a:xfrm rot="5400000">
+            <a:off x="7558134" y="3739004"/>
+            <a:ext cx="405260" cy="2256"/>
+          </a:xfrm>
+          <a:prstGeom prst="curvedConnector3">
+            <a:avLst>
+              <a:gd name="adj1" fmla="val 50000"/>
+            </a:avLst>
+          </a:prstGeom>
+          <a:ln w="76200" cmpd="sng">
+            <a:solidFill>
+              <a:schemeClr val="bg1"/>
+            </a:solidFill>
+            <a:prstDash val="solid"/>
+            <a:round/>
+            <a:tailEnd type="diamond"/>
+          </a:ln>
+        </p:spPr>
+        <p:style>
+          <a:lnRef idx="2">
+            <a:schemeClr val="accent1"/>
+          </a:lnRef>
+          <a:fillRef idx="0">
+            <a:schemeClr val="accent1"/>
+          </a:fillRef>
+          <a:effectRef idx="1">
+            <a:schemeClr val="accent1"/>
+          </a:effectRef>
+          <a:fontRef idx="minor">
+            <a:schemeClr val="tx1"/>
+          </a:fontRef>
+        </p:style>
+      </p:cxnSp>
+      <p:cxnSp>
+        <p:nvCxnSpPr>
+          <p:cNvPr id="253" name="Connector: Curved 252">
+            <a:extLst>
+              <a:ext uri="{FF2B5EF4-FFF2-40B4-BE49-F238E27FC236}">
+                <a16:creationId xmlns:a16="http://schemas.microsoft.com/office/drawing/2014/main" id="{49C60640-1D52-A8AE-D3CE-E0F3F2689B9C}"/>
+              </a:ext>
+            </a:extLst>
+          </p:cNvPr>
+          <p:cNvCxnSpPr>
+            <a:cxnSpLocks/>
+          </p:cNvCxnSpPr>
+          <p:nvPr/>
+        </p:nvCxnSpPr>
+        <p:spPr>
+          <a:xfrm rot="5400000" flipH="1" flipV="1">
+            <a:off x="8168908" y="2581966"/>
+            <a:ext cx="548520" cy="1362550"/>
+          </a:xfrm>
+          <a:prstGeom prst="curvedConnector3">
+            <a:avLst>
+              <a:gd name="adj1" fmla="val 50000"/>
+            </a:avLst>
+          </a:prstGeom>
+          <a:ln w="76200" cmpd="sng">
+            <a:solidFill>
+              <a:schemeClr val="bg1"/>
+            </a:solidFill>
+            <a:prstDash val="solid"/>
+            <a:round/>
+            <a:tailEnd type="none"/>
+          </a:ln>
+        </p:spPr>
+        <p:style>
+          <a:lnRef idx="2">
+            <a:schemeClr val="accent1"/>
+          </a:lnRef>
+          <a:fillRef idx="0">
+            <a:schemeClr val="accent1"/>
+          </a:fillRef>
+          <a:effectRef idx="1">
+            <a:schemeClr val="accent1"/>
+          </a:effectRef>
+          <a:fontRef idx="minor">
+            <a:schemeClr val="tx1"/>
+          </a:fontRef>
+        </p:style>
+      </p:cxnSp>
+      <p:cxnSp>
+        <p:nvCxnSpPr>
+          <p:cNvPr id="254" name="Connector: Curved 253">
+            <a:extLst>
+              <a:ext uri="{FF2B5EF4-FFF2-40B4-BE49-F238E27FC236}">
+                <a16:creationId xmlns:a16="http://schemas.microsoft.com/office/drawing/2014/main" id="{8FBD8DFA-35D9-2EA0-F9AC-1357CA66FD17}"/>
+              </a:ext>
+            </a:extLst>
+          </p:cNvPr>
+          <p:cNvCxnSpPr>
+            <a:cxnSpLocks/>
+          </p:cNvCxnSpPr>
+          <p:nvPr/>
+        </p:nvCxnSpPr>
+        <p:spPr>
+          <a:xfrm rot="16200000" flipV="1">
+            <a:off x="9000563" y="2865098"/>
+            <a:ext cx="247762" cy="1"/>
+          </a:xfrm>
+          <a:prstGeom prst="curvedConnector3">
+            <a:avLst>
+              <a:gd name="adj1" fmla="val 50000"/>
+            </a:avLst>
+          </a:prstGeom>
+          <a:ln w="76200" cmpd="sng">
+            <a:solidFill>
+              <a:schemeClr val="bg1"/>
+            </a:solidFill>
+            <a:prstDash val="solid"/>
+            <a:round/>
+            <a:tailEnd type="none"/>
+          </a:ln>
+        </p:spPr>
+        <p:style>
+          <a:lnRef idx="2">
+            <a:schemeClr val="accent1"/>
+          </a:lnRef>
+          <a:fillRef idx="0">
+            <a:schemeClr val="accent1"/>
+          </a:fillRef>
+          <a:effectRef idx="1">
+            <a:schemeClr val="accent1"/>
+          </a:effectRef>
+          <a:fontRef idx="minor">
+            <a:schemeClr val="tx1"/>
+          </a:fontRef>
+        </p:style>
+      </p:cxnSp>
+      <p:cxnSp>
+        <p:nvCxnSpPr>
+          <p:cNvPr id="257" name="Connector: Curved 256">
+            <a:extLst>
+              <a:ext uri="{FF2B5EF4-FFF2-40B4-BE49-F238E27FC236}">
+                <a16:creationId xmlns:a16="http://schemas.microsoft.com/office/drawing/2014/main" id="{478AFB52-2629-339B-9B22-97BC149E1273}"/>
+              </a:ext>
+            </a:extLst>
+          </p:cNvPr>
+          <p:cNvCxnSpPr>
+            <a:cxnSpLocks/>
+          </p:cNvCxnSpPr>
+          <p:nvPr/>
+        </p:nvCxnSpPr>
+        <p:spPr>
+          <a:xfrm rot="5400000">
+            <a:off x="7558134" y="3740627"/>
+            <a:ext cx="405260" cy="2256"/>
+          </a:xfrm>
+          <a:prstGeom prst="curvedConnector3">
+            <a:avLst>
+              <a:gd name="adj1" fmla="val 50000"/>
+            </a:avLst>
+          </a:prstGeom>
+          <a:ln w="76200" cmpd="dbl">
+            <a:solidFill>
+              <a:srgbClr val="994F87"/>
+            </a:solidFill>
+            <a:prstDash val="solid"/>
+            <a:round/>
+            <a:tailEnd type="diamond"/>
+          </a:ln>
+        </p:spPr>
+        <p:style>
+          <a:lnRef idx="2">
+            <a:schemeClr val="accent1"/>
+          </a:lnRef>
+          <a:fillRef idx="0">
+            <a:schemeClr val="accent1"/>
+          </a:fillRef>
+          <a:effectRef idx="1">
+            <a:schemeClr val="accent1"/>
+          </a:effectRef>
+          <a:fontRef idx="minor">
+            <a:schemeClr val="tx1"/>
+          </a:fontRef>
+        </p:style>
+      </p:cxnSp>
+      <p:cxnSp>
+        <p:nvCxnSpPr>
+          <p:cNvPr id="259" name="Connector: Curved 258">
+            <a:extLst>
+              <a:ext uri="{FF2B5EF4-FFF2-40B4-BE49-F238E27FC236}">
+                <a16:creationId xmlns:a16="http://schemas.microsoft.com/office/drawing/2014/main" id="{1F61EF14-FFC3-8992-7F0C-B29468D6AB0F}"/>
+              </a:ext>
+            </a:extLst>
+          </p:cNvPr>
+          <p:cNvCxnSpPr>
+            <a:cxnSpLocks/>
+          </p:cNvCxnSpPr>
+          <p:nvPr/>
+        </p:nvCxnSpPr>
+        <p:spPr>
+          <a:xfrm rot="5400000" flipH="1" flipV="1">
+            <a:off x="8168908" y="2583589"/>
+            <a:ext cx="548520" cy="1362550"/>
+          </a:xfrm>
+          <a:prstGeom prst="curvedConnector3">
+            <a:avLst>
+              <a:gd name="adj1" fmla="val 50000"/>
+            </a:avLst>
+          </a:prstGeom>
+          <a:ln w="76200" cmpd="dbl">
+            <a:solidFill>
+              <a:srgbClr val="994F87"/>
+            </a:solidFill>
+            <a:prstDash val="solid"/>
+            <a:round/>
+            <a:tailEnd type="none"/>
+          </a:ln>
+        </p:spPr>
+        <p:style>
+          <a:lnRef idx="2">
+            <a:schemeClr val="accent1"/>
+          </a:lnRef>
+          <a:fillRef idx="0">
+            <a:schemeClr val="accent1"/>
+          </a:fillRef>
+          <a:effectRef idx="1">
+            <a:schemeClr val="accent1"/>
+          </a:effectRef>
+          <a:fontRef idx="minor">
+            <a:schemeClr val="tx1"/>
+          </a:fontRef>
+        </p:style>
+      </p:cxnSp>
+      <p:cxnSp>
+        <p:nvCxnSpPr>
+          <p:cNvPr id="261" name="Connector: Curved 260">
+            <a:extLst>
+              <a:ext uri="{FF2B5EF4-FFF2-40B4-BE49-F238E27FC236}">
+                <a16:creationId xmlns:a16="http://schemas.microsoft.com/office/drawing/2014/main" id="{47A8011E-4EC7-8F9F-95C7-08DB9FE211C7}"/>
+              </a:ext>
+            </a:extLst>
+          </p:cNvPr>
+          <p:cNvCxnSpPr>
+            <a:cxnSpLocks/>
+          </p:cNvCxnSpPr>
+          <p:nvPr/>
+        </p:nvCxnSpPr>
+        <p:spPr>
+          <a:xfrm rot="16200000" flipV="1">
+            <a:off x="8920195" y="2786349"/>
+            <a:ext cx="408505" cy="1"/>
+          </a:xfrm>
+          <a:prstGeom prst="curvedConnector3">
+            <a:avLst>
+              <a:gd name="adj1" fmla="val 50000"/>
+            </a:avLst>
+          </a:prstGeom>
+          <a:ln w="76200" cmpd="dbl">
+            <a:solidFill>
+              <a:srgbClr val="994F87"/>
+            </a:solidFill>
+            <a:prstDash val="solid"/>
+            <a:round/>
+            <a:tailEnd type="none"/>
+          </a:ln>
+        </p:spPr>
+        <p:style>
+          <a:lnRef idx="2">
+            <a:schemeClr val="accent1"/>
+          </a:lnRef>
+          <a:fillRef idx="0">
+            <a:schemeClr val="accent1"/>
+          </a:fillRef>
+          <a:effectRef idx="1">
+            <a:schemeClr val="accent1"/>
+          </a:effectRef>
+          <a:fontRef idx="minor">
+            <a:schemeClr val="tx1"/>
+          </a:fontRef>
+        </p:style>
+      </p:cxnSp>
+      <p:cxnSp>
+        <p:nvCxnSpPr>
+          <p:cNvPr id="262" name="Connector: Elbow 261">
+            <a:extLst>
+              <a:ext uri="{FF2B5EF4-FFF2-40B4-BE49-F238E27FC236}">
+                <a16:creationId xmlns:a16="http://schemas.microsoft.com/office/drawing/2014/main" id="{2D4A1F0E-B3AC-BC64-A349-232365740178}"/>
+              </a:ext>
+            </a:extLst>
+          </p:cNvPr>
+          <p:cNvCxnSpPr>
+            <a:cxnSpLocks/>
+          </p:cNvCxnSpPr>
+          <p:nvPr/>
+        </p:nvCxnSpPr>
+        <p:spPr>
+          <a:xfrm flipV="1">
+            <a:off x="1292860" y="949418"/>
+            <a:ext cx="4997705" cy="1321720"/>
+          </a:xfrm>
+          <a:prstGeom prst="bentConnector3">
+            <a:avLst>
+              <a:gd name="adj1" fmla="val 49771"/>
+            </a:avLst>
+          </a:prstGeom>
+          <a:ln w="76200">
+            <a:solidFill>
+              <a:srgbClr val="2C9F2C"/>
+            </a:solidFill>
+            <a:tailEnd type="triangle" w="sm" len="med"/>
+          </a:ln>
+        </p:spPr>
+        <p:style>
+          <a:lnRef idx="2">
+            <a:schemeClr val="accent1"/>
+          </a:lnRef>
+          <a:fillRef idx="0">
+            <a:schemeClr val="accent1"/>
+          </a:fillRef>
+          <a:effectRef idx="1">
+            <a:schemeClr val="accent1"/>
+          </a:effectRef>
+          <a:fontRef idx="minor">
+            <a:schemeClr val="tx1"/>
+          </a:fontRef>
+        </p:style>
+      </p:cxnSp>
+      <p:sp>
+        <p:nvSpPr>
+          <p:cNvPr id="264" name="TextBox 263">
+            <a:extLst>
+              <a:ext uri="{FF2B5EF4-FFF2-40B4-BE49-F238E27FC236}">
+                <a16:creationId xmlns:a16="http://schemas.microsoft.com/office/drawing/2014/main" id="{9542C311-D5AE-CD65-EB80-1BEF10E30640}"/>
+              </a:ext>
+            </a:extLst>
+          </p:cNvPr>
+          <p:cNvSpPr txBox="1">
+            <a:spLocks/>
+          </p:cNvSpPr>
+          <p:nvPr/>
+        </p:nvSpPr>
+        <p:spPr>
+          <a:xfrm>
+            <a:off x="29124" y="3093870"/>
+            <a:ext cx="3566160" cy="523220"/>
+          </a:xfrm>
+          <a:prstGeom prst="rect">
+            <a:avLst/>
+          </a:prstGeom>
+          <a:noFill/>
+        </p:spPr>
+        <p:txBody>
+          <a:bodyPr wrap="none" rtlCol="0">
+            <a:spAutoFit/>
+          </a:bodyPr>
+          <a:lstStyle/>
+          <a:p>
+            <a:r>
+              <a:rPr lang="en-US" sz="2800" b="1" dirty="0"/>
+              <a:t>Host population</a:t>
+            </a:r>
+          </a:p>
+        </p:txBody>
+      </p:sp>
+      <p:sp>
+        <p:nvSpPr>
+          <p:cNvPr id="265" name="TextBox 264">
+            <a:extLst>
+              <a:ext uri="{FF2B5EF4-FFF2-40B4-BE49-F238E27FC236}">
+                <a16:creationId xmlns:a16="http://schemas.microsoft.com/office/drawing/2014/main" id="{394F2462-01EA-0653-BA75-98342093919E}"/>
+              </a:ext>
+            </a:extLst>
+          </p:cNvPr>
+          <p:cNvSpPr txBox="1">
+            <a:spLocks/>
+          </p:cNvSpPr>
+          <p:nvPr/>
+        </p:nvSpPr>
+        <p:spPr>
+          <a:xfrm>
+            <a:off x="3266762" y="1875404"/>
+            <a:ext cx="992899" cy="276999"/>
+          </a:xfrm>
+          <a:prstGeom prst="rect">
+            <a:avLst/>
+          </a:prstGeom>
+          <a:solidFill>
+            <a:schemeClr val="bg1"/>
+          </a:solidFill>
+        </p:spPr>
+        <p:txBody>
+          <a:bodyPr wrap="square" lIns="0" tIns="0" rIns="0" bIns="0" rtlCol="0">
+            <a:spAutoFit/>
+          </a:bodyPr>
+          <a:lstStyle/>
+          <a:p>
+            <a:r>
+              <a:rPr lang="en-US" b="1" dirty="0">
+                <a:solidFill>
+                  <a:schemeClr val="tx1">
+                    <a:lumMod val="50000"/>
+                    <a:lumOff val="50000"/>
+                  </a:schemeClr>
+                </a:solidFill>
+              </a:rPr>
+              <a:t>Exposure</a:t>
+            </a:r>
+          </a:p>
+        </p:txBody>
+      </p:sp>
+      <p:sp>
+        <p:nvSpPr>
+          <p:cNvPr id="266" name="TextBox 265">
+            <a:extLst>
+              <a:ext uri="{FF2B5EF4-FFF2-40B4-BE49-F238E27FC236}">
+                <a16:creationId xmlns:a16="http://schemas.microsoft.com/office/drawing/2014/main" id="{D1A12ED8-CC27-57D8-830C-FE5C8C7D5CB5}"/>
+              </a:ext>
+            </a:extLst>
+          </p:cNvPr>
+          <p:cNvSpPr txBox="1">
+            <a:spLocks/>
+          </p:cNvSpPr>
+          <p:nvPr/>
+        </p:nvSpPr>
+        <p:spPr>
+          <a:xfrm>
+            <a:off x="6233109" y="1875404"/>
+            <a:ext cx="2478978" cy="276999"/>
+          </a:xfrm>
+          <a:prstGeom prst="rect">
+            <a:avLst/>
+          </a:prstGeom>
+          <a:solidFill>
+            <a:schemeClr val="bg1"/>
+          </a:solidFill>
+          <a:ln w="38100">
+            <a:noFill/>
+          </a:ln>
+        </p:spPr>
+        <p:txBody>
+          <a:bodyPr wrap="square" lIns="0" tIns="0" rIns="0" bIns="0" rtlCol="0">
+            <a:spAutoFit/>
+          </a:bodyPr>
+          <a:lstStyle/>
+          <a:p>
+            <a:r>
+              <a:rPr lang="en-US" b="1" dirty="0">
+                <a:solidFill>
+                  <a:schemeClr val="tx1">
+                    <a:lumMod val="50000"/>
+                    <a:lumOff val="50000"/>
+                  </a:schemeClr>
+                </a:solidFill>
+              </a:rPr>
+              <a:t>Pathogen development</a:t>
+            </a:r>
+          </a:p>
+        </p:txBody>
+      </p:sp>
+      <p:pic>
+        <p:nvPicPr>
+          <p:cNvPr id="270" name="Picture 50">
+            <a:extLst>
+              <a:ext uri="{FF2B5EF4-FFF2-40B4-BE49-F238E27FC236}">
+                <a16:creationId xmlns:a16="http://schemas.microsoft.com/office/drawing/2014/main" id="{EBD37DF7-A667-94B5-736A-E6F429362D1C}"/>
+              </a:ext>
+            </a:extLst>
+          </p:cNvPr>
+          <p:cNvPicPr>
+            <a:picLocks noChangeAspect="1"/>
+          </p:cNvPicPr>
+          <p:nvPr/>
+        </p:nvPicPr>
+        <p:blipFill>
+          <a:blip r:embed="rId2">
+            <a:extLst>
+              <a:ext uri="{96DAC541-7B7A-43D3-8B79-37D633B846F1}">
+                <asvg:svgBlip xmlns:asvg="http://schemas.microsoft.com/office/drawing/2016/SVG/main" r:embed="rId3"/>
+              </a:ext>
+            </a:extLst>
+          </a:blip>
+          <a:srcRect/>
+          <a:stretch/>
+        </p:blipFill>
+        <p:spPr>
+          <a:xfrm>
+            <a:off x="430347" y="902787"/>
+            <a:ext cx="2634522" cy="1707974"/>
+          </a:xfrm>
+          <a:prstGeom prst="rect">
+            <a:avLst/>
+          </a:prstGeom>
+        </p:spPr>
+      </p:pic>
+      <p:cxnSp>
+        <p:nvCxnSpPr>
+          <p:cNvPr id="263" name="Connector: Elbow 145">
+            <a:extLst>
+              <a:ext uri="{FF2B5EF4-FFF2-40B4-BE49-F238E27FC236}">
+                <a16:creationId xmlns:a16="http://schemas.microsoft.com/office/drawing/2014/main" id="{81F81A77-F964-6B7D-CD66-5013337B2C2A}"/>
+              </a:ext>
+            </a:extLst>
+          </p:cNvPr>
+          <p:cNvCxnSpPr>
+            <a:cxnSpLocks/>
+          </p:cNvCxnSpPr>
+          <p:nvPr/>
+        </p:nvCxnSpPr>
+        <p:spPr>
+          <a:xfrm>
+            <a:off x="1432719" y="2268166"/>
+            <a:ext cx="3240517" cy="2973"/>
+          </a:xfrm>
+          <a:prstGeom prst="straightConnector1">
+            <a:avLst/>
+          </a:prstGeom>
+          <a:ln w="76200">
+            <a:solidFill>
+              <a:srgbClr val="2C9F2C"/>
+            </a:solidFill>
+            <a:tailEnd type="triangle" w="sm" len="med"/>
+          </a:ln>
+        </p:spPr>
+        <p:style>
+          <a:lnRef idx="2">
+            <a:schemeClr val="accent1"/>
+          </a:lnRef>
+          <a:fillRef idx="0">
+            <a:schemeClr val="accent1"/>
+          </a:fillRef>
+          <a:effectRef idx="1">
+            <a:schemeClr val="accent1"/>
+          </a:effectRef>
+          <a:fontRef idx="minor">
+            <a:schemeClr val="tx1"/>
+          </a:fontRef>
+        </p:style>
+      </p:cxnSp>
+      <p:cxnSp>
+        <p:nvCxnSpPr>
+          <p:cNvPr id="267" name="Connector: Curved 266">
+            <a:extLst>
+              <a:ext uri="{FF2B5EF4-FFF2-40B4-BE49-F238E27FC236}">
+                <a16:creationId xmlns:a16="http://schemas.microsoft.com/office/drawing/2014/main" id="{9D76EDA1-C9E1-527C-54E7-66FABECF6386}"/>
+              </a:ext>
+            </a:extLst>
+          </p:cNvPr>
+          <p:cNvCxnSpPr>
+            <a:cxnSpLocks/>
+          </p:cNvCxnSpPr>
+          <p:nvPr/>
+        </p:nvCxnSpPr>
+        <p:spPr>
+          <a:xfrm rot="16200000" flipV="1">
+            <a:off x="3385755" y="2641839"/>
+            <a:ext cx="773731" cy="0"/>
+          </a:xfrm>
+          <a:prstGeom prst="curvedConnector3">
+            <a:avLst>
+              <a:gd name="adj1" fmla="val 50000"/>
+            </a:avLst>
+          </a:prstGeom>
+          <a:ln w="76200" cmpd="dbl">
+            <a:solidFill>
+              <a:srgbClr val="994F87"/>
+            </a:solidFill>
+            <a:prstDash val="solid"/>
+            <a:round/>
+            <a:tailEnd type="diamond"/>
+          </a:ln>
+        </p:spPr>
+        <p:style>
+          <a:lnRef idx="2">
+            <a:schemeClr val="accent1"/>
+          </a:lnRef>
+          <a:fillRef idx="0">
+            <a:schemeClr val="accent1"/>
+          </a:fillRef>
+          <a:effectRef idx="1">
+            <a:schemeClr val="accent1"/>
+          </a:effectRef>
+          <a:fontRef idx="minor">
+            <a:schemeClr val="tx1"/>
+          </a:fontRef>
+        </p:style>
+      </p:cxnSp>
+      <p:cxnSp>
+        <p:nvCxnSpPr>
+          <p:cNvPr id="268" name="Straight Arrow Connector 267">
+            <a:extLst>
+              <a:ext uri="{FF2B5EF4-FFF2-40B4-BE49-F238E27FC236}">
+                <a16:creationId xmlns:a16="http://schemas.microsoft.com/office/drawing/2014/main" id="{E3633E5A-CF7E-370F-A8BC-F65BDCBB4568}"/>
+              </a:ext>
+            </a:extLst>
+          </p:cNvPr>
+          <p:cNvCxnSpPr>
+            <a:cxnSpLocks/>
+          </p:cNvCxnSpPr>
+          <p:nvPr/>
+        </p:nvCxnSpPr>
+        <p:spPr>
+          <a:xfrm flipV="1">
+            <a:off x="5458869" y="1634949"/>
+            <a:ext cx="3332593" cy="20509"/>
+          </a:xfrm>
+          <a:prstGeom prst="straightConnector1">
+            <a:avLst/>
+          </a:prstGeom>
+          <a:ln w="76200">
+            <a:solidFill>
+              <a:srgbClr val="E73E74"/>
+            </a:solidFill>
+            <a:tailEnd type="triangle" w="sm" len="med"/>
+          </a:ln>
+        </p:spPr>
+        <p:style>
+          <a:lnRef idx="2">
+            <a:schemeClr val="accent1"/>
+          </a:lnRef>
+          <a:fillRef idx="0">
+            <a:schemeClr val="accent1"/>
+          </a:fillRef>
+          <a:effectRef idx="1">
+            <a:schemeClr val="accent1"/>
+          </a:effectRef>
+          <a:fontRef idx="minor">
+            <a:schemeClr val="tx1"/>
+          </a:fontRef>
+        </p:style>
+      </p:cxnSp>
+      <p:pic>
+        <p:nvPicPr>
+          <p:cNvPr id="271" name="Picture 52">
+            <a:extLst>
+              <a:ext uri="{FF2B5EF4-FFF2-40B4-BE49-F238E27FC236}">
+                <a16:creationId xmlns:a16="http://schemas.microsoft.com/office/drawing/2014/main" id="{416E44B4-04DD-B440-158F-312C53500FB6}"/>
+              </a:ext>
+            </a:extLst>
+          </p:cNvPr>
+          <p:cNvPicPr>
+            <a:picLocks noChangeAspect="1"/>
+          </p:cNvPicPr>
+          <p:nvPr/>
+        </p:nvPicPr>
+        <p:blipFill>
+          <a:blip r:embed="rId2">
+            <a:extLst>
+              <a:ext uri="{96DAC541-7B7A-43D3-8B79-37D633B846F1}">
+                <asvg:svgBlip xmlns:asvg="http://schemas.microsoft.com/office/drawing/2016/SVG/main" r:embed="rId3"/>
+              </a:ext>
+            </a:extLst>
+          </a:blip>
+          <a:srcRect/>
+          <a:stretch/>
+        </p:blipFill>
+        <p:spPr>
+          <a:xfrm>
+            <a:off x="8471564" y="902787"/>
+            <a:ext cx="2634522" cy="1707974"/>
+          </a:xfrm>
+          <a:prstGeom prst="rect">
+            <a:avLst/>
+          </a:prstGeom>
+        </p:spPr>
+      </p:pic>
+    </p:spTree>
+    <p:extLst>
+      <p:ext uri="{BB962C8B-B14F-4D97-AF65-F5344CB8AC3E}">
+        <p14:creationId xmlns:p14="http://schemas.microsoft.com/office/powerpoint/2010/main" val="252422778"/>
+      </p:ext>
+    </p:extLst>
+  </p:cSld>
+  <p:clrMapOvr>
+    <a:masterClrMapping/>
+  </p:clrMapOvr>
+</p:sld>
+</file>
+
+<file path=ppt/slides/slide2.xml><?xml version="1.0" encoding="utf-8"?>
+<p:sld xmlns:a="http://schemas.openxmlformats.org/drawingml/2006/main" xmlns:r="http://schemas.openxmlformats.org/officeDocument/2006/relationships" xmlns:p="http://schemas.openxmlformats.org/presentationml/2006/main">
+  <p:cSld>
+    <p:spTree>
+      <p:nvGrpSpPr>
+        <p:cNvPr id="1" name=""/>
+        <p:cNvGrpSpPr/>
+        <p:nvPr/>
+      </p:nvGrpSpPr>
+      <p:grpSpPr>
+        <a:xfrm>
+          <a:off x="0" y="0"/>
+          <a:ext cx="0" cy="0"/>
+          <a:chOff x="0" y="0"/>
+          <a:chExt cx="0" cy="0"/>
+        </a:xfrm>
+      </p:grpSpPr>
+      <p:cxnSp>
+        <p:nvCxnSpPr>
+          <p:cNvPr id="3" name="Connector: Elbow 2">
+            <a:extLst>
+              <a:ext uri="{FF2B5EF4-FFF2-40B4-BE49-F238E27FC236}">
+                <a16:creationId xmlns:a16="http://schemas.microsoft.com/office/drawing/2014/main" id="{1959C1D8-6EAE-235E-86BE-E8F881938F98}"/>
+              </a:ext>
+            </a:extLst>
+          </p:cNvPr>
+          <p:cNvCxnSpPr>
+            <a:cxnSpLocks/>
+            <a:stCxn id="31" idx="1"/>
+            <a:endCxn id="16" idx="2"/>
+          </p:cNvCxnSpPr>
+          <p:nvPr/>
+        </p:nvCxnSpPr>
+        <p:spPr>
+          <a:xfrm rot="10800000">
+            <a:off x="1556924" y="2667089"/>
+            <a:ext cx="1788270" cy="680650"/>
           </a:xfrm>
           <a:prstGeom prst="bentConnector2">
             <a:avLst/>
@@ -3413,10 +4954,10 @@
       </p:cxnSp>
       <p:cxnSp>
         <p:nvCxnSpPr>
-          <p:cNvPr id="164" name="Straight Arrow Connector 163">
-            <a:extLst>
-              <a:ext uri="{FF2B5EF4-FFF2-40B4-BE49-F238E27FC236}">
-                <a16:creationId xmlns:a16="http://schemas.microsoft.com/office/drawing/2014/main" id="{CEBC8F3F-C1E1-4C55-E69B-B27672355AB1}"/>
+          <p:cNvPr id="4" name="Straight Arrow Connector 3">
+            <a:extLst>
+              <a:ext uri="{FF2B5EF4-FFF2-40B4-BE49-F238E27FC236}">
+                <a16:creationId xmlns:a16="http://schemas.microsoft.com/office/drawing/2014/main" id="{EB03755F-099A-6E44-BC49-CB6ED14093CC}"/>
               </a:ext>
             </a:extLst>
           </p:cNvPr>
@@ -3427,7 +4968,7 @@
         </p:nvCxnSpPr>
         <p:spPr>
           <a:xfrm>
-            <a:off x="-85411" y="2284664"/>
+            <a:off x="-85411" y="2081464"/>
             <a:ext cx="782925" cy="0"/>
           </a:xfrm>
           <a:prstGeom prst="straightConnector1">
@@ -3457,10 +4998,10 @@
       </p:cxnSp>
       <p:cxnSp>
         <p:nvCxnSpPr>
-          <p:cNvPr id="165" name="Connector: Elbow 164">
-            <a:extLst>
-              <a:ext uri="{FF2B5EF4-FFF2-40B4-BE49-F238E27FC236}">
-                <a16:creationId xmlns:a16="http://schemas.microsoft.com/office/drawing/2014/main" id="{2CF98B24-2AF9-CA3E-7ED4-B2B3D388429F}"/>
+          <p:cNvPr id="5" name="Connector: Elbow 4">
+            <a:extLst>
+              <a:ext uri="{FF2B5EF4-FFF2-40B4-BE49-F238E27FC236}">
+                <a16:creationId xmlns:a16="http://schemas.microsoft.com/office/drawing/2014/main" id="{1FC1E72E-C1E5-AA83-7C8C-584B5A56BA2D}"/>
               </a:ext>
             </a:extLst>
           </p:cNvPr>
@@ -3471,12 +5012,12 @@
         </p:nvCxnSpPr>
         <p:spPr>
           <a:xfrm flipV="1">
-            <a:off x="8546981" y="603296"/>
-            <a:ext cx="1" cy="4852136"/>
+            <a:off x="8795901" y="590596"/>
+            <a:ext cx="12700" cy="4147286"/>
           </a:xfrm>
           <a:prstGeom prst="bentConnector3">
             <a:avLst>
-              <a:gd name="adj1" fmla="val 22860100000"/>
+              <a:gd name="adj1" fmla="val 1800000"/>
             </a:avLst>
           </a:prstGeom>
           <a:ln w="38100">
@@ -3501,271 +5042,150 @@
           </a:fontRef>
         </p:style>
       </p:cxnSp>
-      <p:grpSp>
-        <p:nvGrpSpPr>
-          <p:cNvPr id="166" name="Group 165">
-            <a:extLst>
-              <a:ext uri="{FF2B5EF4-FFF2-40B4-BE49-F238E27FC236}">
-                <a16:creationId xmlns:a16="http://schemas.microsoft.com/office/drawing/2014/main" id="{79E51E6B-1558-F1AA-A4E3-75B7311EF5C6}"/>
-              </a:ext>
-            </a:extLst>
-          </p:cNvPr>
-          <p:cNvGrpSpPr/>
-          <p:nvPr/>
-        </p:nvGrpSpPr>
-        <p:grpSpPr>
-          <a:xfrm>
-            <a:off x="6791753" y="30481"/>
-            <a:ext cx="1755229" cy="1145629"/>
-            <a:chOff x="5694143" y="2097021"/>
-            <a:chExt cx="1755229" cy="1145629"/>
-          </a:xfrm>
-        </p:grpSpPr>
-        <mc:AlternateContent xmlns:mc="http://schemas.openxmlformats.org/markup-compatibility/2006" xmlns:a14="http://schemas.microsoft.com/office/drawing/2010/main">
-          <mc:Choice Requires="a14">
-            <p:sp>
-              <p:nvSpPr>
-                <p:cNvPr id="167" name="Rectangle: Rounded Corners 166">
-                  <a:extLst>
-                    <a:ext uri="{FF2B5EF4-FFF2-40B4-BE49-F238E27FC236}">
-                      <a16:creationId xmlns:a16="http://schemas.microsoft.com/office/drawing/2014/main" id="{7DF94DFA-6C8F-4F69-C3EC-4C12C54E6A4F}"/>
-                    </a:ext>
-                  </a:extLst>
-                </p:cNvPr>
-                <p:cNvSpPr/>
-                <p:nvPr/>
-              </p:nvSpPr>
-              <p:spPr>
-                <a:xfrm>
-                  <a:off x="5694144" y="2097022"/>
-                  <a:ext cx="1755228" cy="1145628"/>
-                </a:xfrm>
-                <a:prstGeom prst="roundRect">
-                  <a:avLst/>
-                </a:prstGeom>
-                <a:noFill/>
-                <a:ln w="38100">
+      <mc:AlternateContent xmlns:mc="http://schemas.openxmlformats.org/markup-compatibility/2006">
+        <mc:Choice xmlns:a14="http://schemas.microsoft.com/office/drawing/2010/main" Requires="a14">
+          <p:sp>
+            <p:nvSpPr>
+              <p:cNvPr id="6" name="Rectangle: Rounded Corners 5">
+                <a:extLst>
+                  <a:ext uri="{FF2B5EF4-FFF2-40B4-BE49-F238E27FC236}">
+                    <a16:creationId xmlns:a16="http://schemas.microsoft.com/office/drawing/2014/main" id="{57A630EA-2A12-D454-C965-22959C3CC56E}"/>
+                  </a:ext>
+                </a:extLst>
+              </p:cNvPr>
+              <p:cNvSpPr/>
+              <p:nvPr/>
+            </p:nvSpPr>
+            <p:spPr>
+              <a:xfrm>
+                <a:off x="7040673" y="17782"/>
+                <a:ext cx="1755228" cy="1145628"/>
+              </a:xfrm>
+              <a:prstGeom prst="roundRect">
+                <a:avLst/>
+              </a:prstGeom>
+              <a:noFill/>
+              <a:ln w="38100">
+                <a:solidFill>
+                  <a:schemeClr val="tx1"/>
+                </a:solidFill>
+              </a:ln>
+            </p:spPr>
+            <p:style>
+              <a:lnRef idx="2">
+                <a:schemeClr val="accent1">
+                  <a:shade val="15000"/>
+                </a:schemeClr>
+              </a:lnRef>
+              <a:fillRef idx="1">
+                <a:schemeClr val="accent1"/>
+              </a:fillRef>
+              <a:effectRef idx="0">
+                <a:schemeClr val="accent1"/>
+              </a:effectRef>
+              <a:fontRef idx="minor">
+                <a:schemeClr val="lt1"/>
+              </a:fontRef>
+            </p:style>
+            <p:txBody>
+              <a:bodyPr rtlCol="0" anchor="ctr"/>
+              <a:lstStyle/>
+              <a:p>
+                <a:pPr algn="ctr"/>
+                <a14:m>
+                  <m:oMathPara xmlns:m="http://schemas.openxmlformats.org/officeDocument/2006/math">
+                    <m:oMathParaPr>
+                      <m:jc m:val="centerGroup"/>
+                    </m:oMathParaPr>
+                    <m:oMath xmlns:m="http://schemas.openxmlformats.org/officeDocument/2006/math">
+                      <m:r>
+                        <a:rPr lang="en-US" sz="3200" b="0" i="1" smtClean="0">
+                          <a:solidFill>
+                            <a:schemeClr val="tx1"/>
+                          </a:solidFill>
+                          <a:latin typeface="Cambria Math" panose="02040503050406030204" pitchFamily="18" charset="0"/>
+                        </a:rPr>
+                        <m:t>𝑉</m:t>
+                      </m:r>
+                    </m:oMath>
+                  </m:oMathPara>
+                </a14:m>
+                <a:endParaRPr lang="en-US" sz="3200" dirty="0">
                   <a:solidFill>
                     <a:schemeClr val="tx1"/>
                   </a:solidFill>
-                </a:ln>
-              </p:spPr>
-              <p:style>
-                <a:lnRef idx="2">
-                  <a:schemeClr val="accent1">
-                    <a:shade val="15000"/>
-                  </a:schemeClr>
-                </a:lnRef>
-                <a:fillRef idx="1">
-                  <a:schemeClr val="accent1"/>
-                </a:fillRef>
-                <a:effectRef idx="0">
-                  <a:schemeClr val="accent1"/>
-                </a:effectRef>
-                <a:fontRef idx="minor">
-                  <a:schemeClr val="lt1"/>
-                </a:fontRef>
-              </p:style>
-              <p:txBody>
-                <a:bodyPr rtlCol="0" anchor="ctr"/>
-                <a:lstStyle/>
-                <a:p>
-                  <a:pPr algn="ctr"/>
-                  <a14:m>
-                    <m:oMathPara xmlns:m="http://schemas.openxmlformats.org/officeDocument/2006/math">
-                      <m:oMathParaPr>
-                        <m:jc m:val="centerGroup"/>
-                      </m:oMathParaPr>
-                      <m:oMath xmlns:m="http://schemas.openxmlformats.org/officeDocument/2006/math">
-                        <m:r>
-                          <a:rPr lang="en-US" sz="3200" b="0" i="1" smtClean="0">
-                            <a:solidFill>
-                              <a:schemeClr val="tx1"/>
-                            </a:solidFill>
-                            <a:latin typeface="Cambria Math" panose="02040503050406030204" pitchFamily="18" charset="0"/>
-                          </a:rPr>
-                          <m:t>𝑉</m:t>
-                        </m:r>
-                      </m:oMath>
-                    </m:oMathPara>
-                  </a14:m>
-                  <a:endParaRPr lang="en-US" sz="3200" dirty="0">
+                </a:endParaRPr>
+              </a:p>
+              <a:p>
+                <a:pPr algn="ctr"/>
+                <a:r>
+                  <a:rPr lang="en-US" sz="1500" dirty="0">
                     <a:solidFill>
                       <a:schemeClr val="tx1"/>
                     </a:solidFill>
-                  </a:endParaRPr>
-                </a:p>
-                <a:p>
-                  <a:pPr algn="ctr"/>
-                  <a:r>
-                    <a:rPr lang="en-US" sz="1500" dirty="0">
-                      <a:solidFill>
-                        <a:schemeClr val="tx1"/>
-                      </a:solidFill>
-                    </a:rPr>
-                    <a:t>Oviposition stage</a:t>
-                  </a:r>
-                </a:p>
-              </p:txBody>
-            </p:sp>
-          </mc:Choice>
-          <mc:Fallback xmlns="">
-            <p:sp>
-              <p:nvSpPr>
-                <p:cNvPr id="5" name="Rectangle: Rounded Corners 4">
-                  <a:extLst>
-                    <a:ext uri="{FF2B5EF4-FFF2-40B4-BE49-F238E27FC236}">
-                      <a16:creationId xmlns:a16="http://schemas.microsoft.com/office/drawing/2014/main" id="{5C8EF43D-B0E3-573B-9EBD-E26E9A11C704}"/>
-                    </a:ext>
-                  </a:extLst>
-                </p:cNvPr>
-                <p:cNvSpPr>
-                  <a:spLocks noRot="1" noChangeAspect="1" noMove="1" noResize="1" noEditPoints="1" noAdjustHandles="1" noChangeArrowheads="1" noChangeShapeType="1" noTextEdit="1"/>
-                </p:cNvSpPr>
-                <p:nvPr/>
-              </p:nvSpPr>
-              <p:spPr>
-                <a:xfrm>
-                  <a:off x="5694144" y="2097022"/>
-                  <a:ext cx="1755228" cy="1145628"/>
-                </a:xfrm>
-                <a:prstGeom prst="roundRect">
-                  <a:avLst/>
-                </a:prstGeom>
-                <a:blipFill>
-                  <a:blip r:embed="rId2"/>
-                  <a:stretch>
-                    <a:fillRect/>
-                  </a:stretch>
-                </a:blipFill>
-                <a:ln w="38100">
-                  <a:solidFill>
-                    <a:schemeClr val="tx1"/>
-                  </a:solidFill>
-                </a:ln>
-              </p:spPr>
-              <p:txBody>
-                <a:bodyPr/>
-                <a:lstStyle/>
-                <a:p>
-                  <a:r>
-                    <a:rPr lang="en-US">
-                      <a:noFill/>
-                    </a:rPr>
-                    <a:t> </a:t>
-                  </a:r>
-                </a:p>
-              </p:txBody>
-            </p:sp>
-          </mc:Fallback>
-        </mc:AlternateContent>
-        <p:sp>
-          <p:nvSpPr>
-            <p:cNvPr id="168" name="Oval 167">
-              <a:extLst>
-                <a:ext uri="{FF2B5EF4-FFF2-40B4-BE49-F238E27FC236}">
-                  <a16:creationId xmlns:a16="http://schemas.microsoft.com/office/drawing/2014/main" id="{C436E269-B74A-2D09-2237-F0C1D102B962}"/>
-                </a:ext>
-              </a:extLst>
-            </p:cNvPr>
-            <p:cNvSpPr/>
-            <p:nvPr/>
-          </p:nvSpPr>
-          <p:spPr>
-            <a:xfrm>
-              <a:off x="5694143" y="2109833"/>
-              <a:ext cx="293728" cy="307254"/>
-            </a:xfrm>
-            <a:prstGeom prst="ellipse">
-              <a:avLst/>
-            </a:prstGeom>
-            <a:noFill/>
-            <a:ln>
-              <a:noFill/>
-            </a:ln>
-          </p:spPr>
-          <p:style>
-            <a:lnRef idx="2">
-              <a:schemeClr val="accent1">
-                <a:shade val="15000"/>
-              </a:schemeClr>
-            </a:lnRef>
-            <a:fillRef idx="1">
-              <a:schemeClr val="accent1"/>
-            </a:fillRef>
-            <a:effectRef idx="0">
-              <a:schemeClr val="accent1"/>
-            </a:effectRef>
-            <a:fontRef idx="minor">
-              <a:schemeClr val="lt1"/>
-            </a:fontRef>
-          </p:style>
-          <p:txBody>
-            <a:bodyPr rtlCol="0" anchor="ctr"/>
-            <a:lstStyle/>
-            <a:p>
-              <a:pPr algn="ctr"/>
-              <a:endParaRPr lang="en-US"/>
-            </a:p>
-          </p:txBody>
-        </p:sp>
-        <p:sp>
-          <p:nvSpPr>
-            <p:cNvPr id="169" name="Oval 168">
-              <a:extLst>
-                <a:ext uri="{FF2B5EF4-FFF2-40B4-BE49-F238E27FC236}">
-                  <a16:creationId xmlns:a16="http://schemas.microsoft.com/office/drawing/2014/main" id="{DB50D3B0-4B7D-9B42-7970-89E551AA122D}"/>
-                </a:ext>
-              </a:extLst>
-            </p:cNvPr>
-            <p:cNvSpPr/>
-            <p:nvPr/>
-          </p:nvSpPr>
-          <p:spPr>
-            <a:xfrm>
-              <a:off x="7155644" y="2097021"/>
-              <a:ext cx="293728" cy="307254"/>
-            </a:xfrm>
-            <a:prstGeom prst="ellipse">
-              <a:avLst/>
-            </a:prstGeom>
-            <a:noFill/>
-            <a:ln>
-              <a:noFill/>
-            </a:ln>
-          </p:spPr>
-          <p:style>
-            <a:lnRef idx="2">
-              <a:schemeClr val="accent1">
-                <a:shade val="15000"/>
-              </a:schemeClr>
-            </a:lnRef>
-            <a:fillRef idx="1">
-              <a:schemeClr val="accent1"/>
-            </a:fillRef>
-            <a:effectRef idx="0">
-              <a:schemeClr val="accent1"/>
-            </a:effectRef>
-            <a:fontRef idx="minor">
-              <a:schemeClr val="lt1"/>
-            </a:fontRef>
-          </p:style>
-          <p:txBody>
-            <a:bodyPr rtlCol="0" anchor="ctr"/>
-            <a:lstStyle/>
-            <a:p>
-              <a:pPr algn="ctr"/>
-              <a:endParaRPr lang="en-US"/>
-            </a:p>
-          </p:txBody>
-        </p:sp>
-      </p:grpSp>
+                  </a:rPr>
+                  <a:t>Oviposition stage</a:t>
+                </a:r>
+              </a:p>
+            </p:txBody>
+          </p:sp>
+        </mc:Choice>
+        <mc:Fallback>
+          <p:sp>
+            <p:nvSpPr>
+              <p:cNvPr id="6" name="Rectangle: Rounded Corners 5">
+                <a:extLst>
+                  <a:ext uri="{FF2B5EF4-FFF2-40B4-BE49-F238E27FC236}">
+                    <a16:creationId xmlns:a16="http://schemas.microsoft.com/office/drawing/2014/main" id="{57A630EA-2A12-D454-C965-22959C3CC56E}"/>
+                  </a:ext>
+                </a:extLst>
+              </p:cNvPr>
+              <p:cNvSpPr>
+                <a:spLocks noRot="1" noChangeAspect="1" noMove="1" noResize="1" noEditPoints="1" noAdjustHandles="1" noChangeArrowheads="1" noChangeShapeType="1" noTextEdit="1"/>
+              </p:cNvSpPr>
+              <p:nvPr/>
+            </p:nvSpPr>
+            <p:spPr>
+              <a:xfrm>
+                <a:off x="7040673" y="17782"/>
+                <a:ext cx="1755228" cy="1145628"/>
+              </a:xfrm>
+              <a:prstGeom prst="roundRect">
+                <a:avLst/>
+              </a:prstGeom>
+              <a:blipFill>
+                <a:blip r:embed="rId2"/>
+                <a:stretch>
+                  <a:fillRect/>
+                </a:stretch>
+              </a:blipFill>
+              <a:ln w="38100">
+                <a:solidFill>
+                  <a:schemeClr val="tx1"/>
+                </a:solidFill>
+              </a:ln>
+            </p:spPr>
+            <p:txBody>
+              <a:bodyPr/>
+              <a:lstStyle/>
+              <a:p>
+                <a:r>
+                  <a:rPr lang="en-US">
+                    <a:noFill/>
+                  </a:rPr>
+                  <a:t> </a:t>
+                </a:r>
+              </a:p>
+            </p:txBody>
+          </p:sp>
+        </mc:Fallback>
+      </mc:AlternateContent>
       <p:sp>
         <p:nvSpPr>
-          <p:cNvPr id="170" name="Oval 169">
-            <a:extLst>
-              <a:ext uri="{FF2B5EF4-FFF2-40B4-BE49-F238E27FC236}">
-                <a16:creationId xmlns:a16="http://schemas.microsoft.com/office/drawing/2014/main" id="{F5E65F28-4A2A-CD34-AB42-0052B410D5A2}"/>
+          <p:cNvPr id="9" name="Oval 8">
+            <a:extLst>
+              <a:ext uri="{FF2B5EF4-FFF2-40B4-BE49-F238E27FC236}">
+                <a16:creationId xmlns:a16="http://schemas.microsoft.com/office/drawing/2014/main" id="{C7189DD4-95E6-64AF-8BAC-C31BC142D9A1}"/>
               </a:ext>
             </a:extLst>
           </p:cNvPr>
@@ -3774,7 +5194,7 @@
         </p:nvSpPr>
         <p:spPr>
           <a:xfrm>
-            <a:off x="1263196" y="872254"/>
+            <a:off x="1263196" y="859554"/>
             <a:ext cx="293728" cy="307254"/>
           </a:xfrm>
           <a:prstGeom prst="ellipse">
@@ -3812,24 +5232,22 @@
       </p:sp>
       <p:cxnSp>
         <p:nvCxnSpPr>
-          <p:cNvPr id="171" name="Straight Arrow Connector 170">
-            <a:extLst>
-              <a:ext uri="{FF2B5EF4-FFF2-40B4-BE49-F238E27FC236}">
-                <a16:creationId xmlns:a16="http://schemas.microsoft.com/office/drawing/2014/main" id="{41BE7E01-FC55-A1E1-EDF8-AF8E8986A078}"/>
+          <p:cNvPr id="10" name="Straight Arrow Connector 9">
+            <a:extLst>
+              <a:ext uri="{FF2B5EF4-FFF2-40B4-BE49-F238E27FC236}">
+                <a16:creationId xmlns:a16="http://schemas.microsoft.com/office/drawing/2014/main" id="{21728706-CAF0-1600-B102-293AD647C941}"/>
               </a:ext>
             </a:extLst>
           </p:cNvPr>
           <p:cNvCxnSpPr>
             <a:cxnSpLocks/>
-            <a:stCxn id="167" idx="1"/>
-            <a:endCxn id="175" idx="3"/>
           </p:cNvCxnSpPr>
           <p:nvPr/>
         </p:nvCxnSpPr>
         <p:spPr>
           <a:xfrm flipH="1" flipV="1">
-            <a:off x="2434538" y="603295"/>
-            <a:ext cx="4357216" cy="1"/>
+            <a:off x="2434538" y="590595"/>
+            <a:ext cx="4606135" cy="1"/>
           </a:xfrm>
           <a:prstGeom prst="straightConnector1">
             <a:avLst/>
@@ -3860,10 +5278,10 @@
         <mc:Choice xmlns:a14="http://schemas.microsoft.com/office/drawing/2010/main" Requires="a14">
           <p:sp>
             <p:nvSpPr>
-              <p:cNvPr id="172" name="TextBox 171">
+              <p:cNvPr id="11" name="TextBox 10">
                 <a:extLst>
                   <a:ext uri="{FF2B5EF4-FFF2-40B4-BE49-F238E27FC236}">
-                    <a16:creationId xmlns:a16="http://schemas.microsoft.com/office/drawing/2014/main" id="{D0223383-539F-77AF-3564-D9220A43B1ED}"/>
+                    <a16:creationId xmlns:a16="http://schemas.microsoft.com/office/drawing/2014/main" id="{C6144DBD-6A04-983F-E527-B3AC7DA70DC5}"/>
                   </a:ext>
                 </a:extLst>
               </p:cNvPr>
@@ -3872,7 +5290,7 @@
             </p:nvSpPr>
             <p:spPr>
               <a:xfrm>
-                <a:off x="169132" y="1955203"/>
+                <a:off x="130875" y="1702599"/>
                 <a:ext cx="262315" cy="296428"/>
               </a:xfrm>
               <a:prstGeom prst="rect">
@@ -3929,10 +5347,10 @@
         <mc:Fallback>
           <p:sp>
             <p:nvSpPr>
-              <p:cNvPr id="172" name="TextBox 171">
+              <p:cNvPr id="11" name="TextBox 10">
                 <a:extLst>
                   <a:ext uri="{FF2B5EF4-FFF2-40B4-BE49-F238E27FC236}">
-                    <a16:creationId xmlns:a16="http://schemas.microsoft.com/office/drawing/2014/main" id="{D0223383-539F-77AF-3564-D9220A43B1ED}"/>
+                    <a16:creationId xmlns:a16="http://schemas.microsoft.com/office/drawing/2014/main" id="{C6144DBD-6A04-983F-E527-B3AC7DA70DC5}"/>
                   </a:ext>
                 </a:extLst>
               </p:cNvPr>
@@ -3943,7 +5361,7 @@
             </p:nvSpPr>
             <p:spPr>
               <a:xfrm>
-                <a:off x="169132" y="1955203"/>
+                <a:off x="130875" y="1702599"/>
                 <a:ext cx="262315" cy="296428"/>
               </a:xfrm>
               <a:prstGeom prst="rect">
@@ -3952,7 +5370,7 @@
               <a:blipFill>
                 <a:blip r:embed="rId3"/>
                 <a:stretch>
-                  <a:fillRect l="-23256" r="-16279" b="-27083"/>
+                  <a:fillRect l="-23256" r="-16279" b="-24490"/>
                 </a:stretch>
               </a:blipFill>
             </p:spPr>
@@ -3975,10 +5393,10 @@
         <mc:Choice xmlns:a14="http://schemas.microsoft.com/office/drawing/2010/main" Requires="a14">
           <p:sp>
             <p:nvSpPr>
-              <p:cNvPr id="173" name="TextBox 172">
+              <p:cNvPr id="12" name="TextBox 11">
                 <a:extLst>
                   <a:ext uri="{FF2B5EF4-FFF2-40B4-BE49-F238E27FC236}">
-                    <a16:creationId xmlns:a16="http://schemas.microsoft.com/office/drawing/2014/main" id="{0DB50D61-40FF-0F62-8687-1FCB2B65E869}"/>
+                    <a16:creationId xmlns:a16="http://schemas.microsoft.com/office/drawing/2014/main" id="{C6BD6DFB-E05C-E14A-161D-3CA685EE93FB}"/>
                   </a:ext>
                 </a:extLst>
               </p:cNvPr>
@@ -3987,7 +5405,7 @@
             </p:nvSpPr>
             <p:spPr>
               <a:xfrm>
-                <a:off x="1177766" y="1310186"/>
+                <a:off x="1204890" y="1163409"/>
                 <a:ext cx="285847" cy="276999"/>
               </a:xfrm>
               <a:prstGeom prst="rect">
@@ -4044,10 +5462,10 @@
         <mc:Fallback>
           <p:sp>
             <p:nvSpPr>
-              <p:cNvPr id="173" name="TextBox 172">
+              <p:cNvPr id="12" name="TextBox 11">
                 <a:extLst>
                   <a:ext uri="{FF2B5EF4-FFF2-40B4-BE49-F238E27FC236}">
-                    <a16:creationId xmlns:a16="http://schemas.microsoft.com/office/drawing/2014/main" id="{0DB50D61-40FF-0F62-8687-1FCB2B65E869}"/>
+                    <a16:creationId xmlns:a16="http://schemas.microsoft.com/office/drawing/2014/main" id="{C6BD6DFB-E05C-E14A-161D-3CA685EE93FB}"/>
                   </a:ext>
                 </a:extLst>
               </p:cNvPr>
@@ -4058,7 +5476,7 @@
             </p:nvSpPr>
             <p:spPr>
               <a:xfrm>
-                <a:off x="1177766" y="1310186"/>
+                <a:off x="1204890" y="1163409"/>
                 <a:ext cx="285847" cy="276999"/>
               </a:xfrm>
               <a:prstGeom prst="rect">
@@ -4067,7 +5485,7 @@
               <a:blipFill>
                 <a:blip r:embed="rId4"/>
                 <a:stretch>
-                  <a:fillRect l="-19149" r="-8511" b="-22222"/>
+                  <a:fillRect l="-21277" r="-6383" b="-22222"/>
                 </a:stretch>
               </a:blipFill>
             </p:spPr>
@@ -4090,10 +5508,10 @@
         <mc:Choice xmlns:a14="http://schemas.microsoft.com/office/drawing/2010/main" Requires="a14">
           <p:sp>
             <p:nvSpPr>
-              <p:cNvPr id="174" name="TextBox 173">
+              <p:cNvPr id="13" name="TextBox 12">
                 <a:extLst>
                   <a:ext uri="{FF2B5EF4-FFF2-40B4-BE49-F238E27FC236}">
-                    <a16:creationId xmlns:a16="http://schemas.microsoft.com/office/drawing/2014/main" id="{4C5CB581-2514-356F-758C-0EB7F4FC48F4}"/>
+                    <a16:creationId xmlns:a16="http://schemas.microsoft.com/office/drawing/2014/main" id="{BF1E0CB6-2D82-F3EA-0461-9D6E1A74E459}"/>
                   </a:ext>
                 </a:extLst>
               </p:cNvPr>
@@ -4102,7 +5520,7 @@
             </p:nvSpPr>
             <p:spPr>
               <a:xfrm>
-                <a:off x="4815662" y="158377"/>
+                <a:off x="4594682" y="215521"/>
                 <a:ext cx="285847" cy="276999"/>
               </a:xfrm>
               <a:prstGeom prst="rect">
@@ -4159,10 +5577,10 @@
         <mc:Fallback>
           <p:sp>
             <p:nvSpPr>
-              <p:cNvPr id="174" name="TextBox 173">
+              <p:cNvPr id="13" name="TextBox 12">
                 <a:extLst>
                   <a:ext uri="{FF2B5EF4-FFF2-40B4-BE49-F238E27FC236}">
-                    <a16:creationId xmlns:a16="http://schemas.microsoft.com/office/drawing/2014/main" id="{4C5CB581-2514-356F-758C-0EB7F4FC48F4}"/>
+                    <a16:creationId xmlns:a16="http://schemas.microsoft.com/office/drawing/2014/main" id="{BF1E0CB6-2D82-F3EA-0461-9D6E1A74E459}"/>
                   </a:ext>
                 </a:extLst>
               </p:cNvPr>
@@ -4173,7 +5591,7 @@
             </p:nvSpPr>
             <p:spPr>
               <a:xfrm>
-                <a:off x="4815662" y="158377"/>
+                <a:off x="4594682" y="215521"/>
                 <a:ext cx="285847" cy="276999"/>
               </a:xfrm>
               <a:prstGeom prst="rect">
@@ -4182,7 +5600,7 @@
               <a:blipFill>
                 <a:blip r:embed="rId5"/>
                 <a:stretch>
-                  <a:fillRect l="-21277" r="-6383" b="-22222"/>
+                  <a:fillRect l="-21277" r="-6383" b="-21739"/>
                 </a:stretch>
               </a:blipFill>
             </p:spPr>
@@ -4205,10 +5623,10 @@
         <mc:Choice xmlns:a14="http://schemas.microsoft.com/office/drawing/2010/main" Requires="a14">
           <p:sp>
             <p:nvSpPr>
-              <p:cNvPr id="175" name="Rectangle: Rounded Corners 174">
+              <p:cNvPr id="14" name="Rectangle: Rounded Corners 13">
                 <a:extLst>
                   <a:ext uri="{FF2B5EF4-FFF2-40B4-BE49-F238E27FC236}">
-                    <a16:creationId xmlns:a16="http://schemas.microsoft.com/office/drawing/2014/main" id="{D45951E3-0EBC-EC3B-5181-0675850829DD}"/>
+                    <a16:creationId xmlns:a16="http://schemas.microsoft.com/office/drawing/2014/main" id="{6A65E87D-A9A9-EB81-D94E-788111C9B35B}"/>
                   </a:ext>
                 </a:extLst>
               </p:cNvPr>
@@ -4217,7 +5635,7 @@
             </p:nvSpPr>
             <p:spPr>
               <a:xfrm>
-                <a:off x="679310" y="30481"/>
+                <a:off x="679310" y="17781"/>
                 <a:ext cx="1755228" cy="1145628"/>
               </a:xfrm>
               <a:prstGeom prst="roundRect">
@@ -4297,10 +5715,10 @@
         <mc:Fallback>
           <p:sp>
             <p:nvSpPr>
-              <p:cNvPr id="175" name="Rectangle: Rounded Corners 174">
+              <p:cNvPr id="14" name="Rectangle: Rounded Corners 13">
                 <a:extLst>
                   <a:ext uri="{FF2B5EF4-FFF2-40B4-BE49-F238E27FC236}">
-                    <a16:creationId xmlns:a16="http://schemas.microsoft.com/office/drawing/2014/main" id="{D45951E3-0EBC-EC3B-5181-0675850829DD}"/>
+                    <a16:creationId xmlns:a16="http://schemas.microsoft.com/office/drawing/2014/main" id="{6A65E87D-A9A9-EB81-D94E-788111C9B35B}"/>
                   </a:ext>
                 </a:extLst>
               </p:cNvPr>
@@ -4311,7 +5729,7 @@
             </p:nvSpPr>
             <p:spPr>
               <a:xfrm>
-                <a:off x="679310" y="30481"/>
+                <a:off x="679310" y="17781"/>
                 <a:ext cx="1755228" cy="1145628"/>
               </a:xfrm>
               <a:prstGeom prst="roundRect">
@@ -4346,24 +5764,24 @@
       </mc:AlternateContent>
       <p:cxnSp>
         <p:nvCxnSpPr>
-          <p:cNvPr id="176" name="Straight Arrow Connector 175">
-            <a:extLst>
-              <a:ext uri="{FF2B5EF4-FFF2-40B4-BE49-F238E27FC236}">
-                <a16:creationId xmlns:a16="http://schemas.microsoft.com/office/drawing/2014/main" id="{5A6D87B2-1F97-A0C5-77AF-AB2036B7DA92}"/>
+          <p:cNvPr id="15" name="Straight Arrow Connector 14">
+            <a:extLst>
+              <a:ext uri="{FF2B5EF4-FFF2-40B4-BE49-F238E27FC236}">
+                <a16:creationId xmlns:a16="http://schemas.microsoft.com/office/drawing/2014/main" id="{CDC2238E-4901-CB59-75F3-825E14AAB13E}"/>
               </a:ext>
             </a:extLst>
           </p:cNvPr>
           <p:cNvCxnSpPr>
             <a:cxnSpLocks/>
-            <a:stCxn id="175" idx="2"/>
-            <a:endCxn id="177" idx="0"/>
+            <a:stCxn id="14" idx="2"/>
+            <a:endCxn id="16" idx="0"/>
           </p:cNvCxnSpPr>
           <p:nvPr/>
         </p:nvCxnSpPr>
         <p:spPr>
           <a:xfrm>
-            <a:off x="1556924" y="1176109"/>
-            <a:ext cx="0" cy="548552"/>
+            <a:off x="1556924" y="1163409"/>
+            <a:ext cx="0" cy="358052"/>
           </a:xfrm>
           <a:prstGeom prst="straightConnector1">
             <a:avLst/>
@@ -4394,10 +5812,10 @@
         <mc:Choice xmlns:a14="http://schemas.microsoft.com/office/drawing/2010/main" Requires="a14">
           <p:sp>
             <p:nvSpPr>
-              <p:cNvPr id="177" name="Rectangle: Rounded Corners 176">
+              <p:cNvPr id="16" name="Rectangle: Rounded Corners 15">
                 <a:extLst>
                   <a:ext uri="{FF2B5EF4-FFF2-40B4-BE49-F238E27FC236}">
-                    <a16:creationId xmlns:a16="http://schemas.microsoft.com/office/drawing/2014/main" id="{EEAFCC46-4F94-CFC8-F2BD-DC6F7721045F}"/>
+                    <a16:creationId xmlns:a16="http://schemas.microsoft.com/office/drawing/2014/main" id="{316F327D-E657-11C9-B1A1-621BEADD1AA1}"/>
                   </a:ext>
                 </a:extLst>
               </p:cNvPr>
@@ -4406,7 +5824,7 @@
             </p:nvSpPr>
             <p:spPr>
               <a:xfrm>
-                <a:off x="679310" y="1724661"/>
+                <a:off x="679310" y="1521461"/>
                 <a:ext cx="1755228" cy="1145628"/>
               </a:xfrm>
               <a:prstGeom prst="roundRect">
@@ -4481,10 +5899,10 @@
         <mc:Fallback>
           <p:sp>
             <p:nvSpPr>
-              <p:cNvPr id="177" name="Rectangle: Rounded Corners 176">
+              <p:cNvPr id="16" name="Rectangle: Rounded Corners 15">
                 <a:extLst>
                   <a:ext uri="{FF2B5EF4-FFF2-40B4-BE49-F238E27FC236}">
-                    <a16:creationId xmlns:a16="http://schemas.microsoft.com/office/drawing/2014/main" id="{EEAFCC46-4F94-CFC8-F2BD-DC6F7721045F}"/>
+                    <a16:creationId xmlns:a16="http://schemas.microsoft.com/office/drawing/2014/main" id="{316F327D-E657-11C9-B1A1-621BEADD1AA1}"/>
                   </a:ext>
                 </a:extLst>
               </p:cNvPr>
@@ -4495,7 +5913,7 @@
             </p:nvSpPr>
             <p:spPr>
               <a:xfrm>
-                <a:off x="679310" y="1724661"/>
+                <a:off x="679310" y="1521461"/>
                 <a:ext cx="1755228" cy="1145628"/>
               </a:xfrm>
               <a:prstGeom prst="roundRect">
@@ -4532,10 +5950,10 @@
         <mc:Choice xmlns:a14="http://schemas.microsoft.com/office/drawing/2010/main" Requires="a14">
           <p:sp>
             <p:nvSpPr>
-              <p:cNvPr id="178" name="Rectangle: Rounded Corners 177">
+              <p:cNvPr id="17" name="Rectangle: Rounded Corners 16">
                 <a:extLst>
                   <a:ext uri="{FF2B5EF4-FFF2-40B4-BE49-F238E27FC236}">
-                    <a16:creationId xmlns:a16="http://schemas.microsoft.com/office/drawing/2014/main" id="{AD78CB1B-5AEC-630C-CEE4-86031C9B341F}"/>
+                    <a16:creationId xmlns:a16="http://schemas.microsoft.com/office/drawing/2014/main" id="{978544AE-2209-EA44-666E-701EAC24D0A1}"/>
                   </a:ext>
                 </a:extLst>
               </p:cNvPr>
@@ -4544,7 +5962,7 @@
             </p:nvSpPr>
             <p:spPr>
               <a:xfrm>
-                <a:off x="2759798" y="2780730"/>
+                <a:off x="5196656" y="3271648"/>
                 <a:ext cx="1755228" cy="1145628"/>
               </a:xfrm>
               <a:prstGeom prst="roundRect">
@@ -4591,7 +6009,7 @@
                           </a:solidFill>
                           <a:latin typeface="Cambria Math" panose="02040503050406030204" pitchFamily="18" charset="0"/>
                         </a:rPr>
-                        <m:t>𝐿</m:t>
+                        <m:t>𝑃</m:t>
                       </m:r>
                     </m:oMath>
                   </m:oMathPara>
@@ -4610,7 +6028,7 @@
                       <a:schemeClr val="tx1"/>
                     </a:solidFill>
                   </a:rPr>
-                  <a:t>Landing</a:t>
+                  <a:t>Probing</a:t>
                 </a:r>
               </a:p>
             </p:txBody>
@@ -4619,10 +6037,10 @@
         <mc:Fallback>
           <p:sp>
             <p:nvSpPr>
-              <p:cNvPr id="178" name="Rectangle: Rounded Corners 177">
+              <p:cNvPr id="17" name="Rectangle: Rounded Corners 16">
                 <a:extLst>
                   <a:ext uri="{FF2B5EF4-FFF2-40B4-BE49-F238E27FC236}">
-                    <a16:creationId xmlns:a16="http://schemas.microsoft.com/office/drawing/2014/main" id="{AD78CB1B-5AEC-630C-CEE4-86031C9B341F}"/>
+                    <a16:creationId xmlns:a16="http://schemas.microsoft.com/office/drawing/2014/main" id="{978544AE-2209-EA44-666E-701EAC24D0A1}"/>
                   </a:ext>
                 </a:extLst>
               </p:cNvPr>
@@ -4633,7 +6051,7 @@
             </p:nvSpPr>
             <p:spPr>
               <a:xfrm>
-                <a:off x="2759798" y="2780730"/>
+                <a:off x="5196656" y="3271648"/>
                 <a:ext cx="1755228" cy="1145628"/>
               </a:xfrm>
               <a:prstGeom prst="roundRect">
@@ -4668,23 +6086,24 @@
       </mc:AlternateContent>
       <p:cxnSp>
         <p:nvCxnSpPr>
-          <p:cNvPr id="181" name="Connector: Elbow 180">
-            <a:extLst>
-              <a:ext uri="{FF2B5EF4-FFF2-40B4-BE49-F238E27FC236}">
-                <a16:creationId xmlns:a16="http://schemas.microsoft.com/office/drawing/2014/main" id="{CCEE0EFE-CB2C-9F6C-4073-941D1FCBFFB2}"/>
+          <p:cNvPr id="18" name="Connector: Elbow 17">
+            <a:extLst>
+              <a:ext uri="{FF2B5EF4-FFF2-40B4-BE49-F238E27FC236}">
+                <a16:creationId xmlns:a16="http://schemas.microsoft.com/office/drawing/2014/main" id="{94195AE1-A2E5-3B4C-1E74-90CB80DA15B5}"/>
               </a:ext>
             </a:extLst>
           </p:cNvPr>
           <p:cNvCxnSpPr>
             <a:cxnSpLocks/>
-            <a:endCxn id="179" idx="0"/>
+            <a:stCxn id="30" idx="3"/>
+            <a:endCxn id="17" idx="0"/>
           </p:cNvCxnSpPr>
           <p:nvPr/>
         </p:nvCxnSpPr>
         <p:spPr>
           <a:xfrm>
-            <a:off x="4515026" y="3353544"/>
-            <a:ext cx="1194754" cy="483254"/>
+            <a:off x="5109386" y="2969369"/>
+            <a:ext cx="964884" cy="302279"/>
           </a:xfrm>
           <a:prstGeom prst="bentConnector2">
             <a:avLst/>
@@ -4713,10 +6132,10 @@
       </p:cxnSp>
       <p:cxnSp>
         <p:nvCxnSpPr>
-          <p:cNvPr id="182" name="Connector: Elbow 181">
-            <a:extLst>
-              <a:ext uri="{FF2B5EF4-FFF2-40B4-BE49-F238E27FC236}">
-                <a16:creationId xmlns:a16="http://schemas.microsoft.com/office/drawing/2014/main" id="{982267C1-7CE5-4E11-1D8E-99931D70F3F4}"/>
+          <p:cNvPr id="19" name="Connector: Elbow 18">
+            <a:extLst>
+              <a:ext uri="{FF2B5EF4-FFF2-40B4-BE49-F238E27FC236}">
+                <a16:creationId xmlns:a16="http://schemas.microsoft.com/office/drawing/2014/main" id="{6DAD1E55-82D4-658A-F025-D0C84E2BB0A6}"/>
               </a:ext>
             </a:extLst>
           </p:cNvPr>
@@ -4727,8 +6146,8 @@
         </p:nvCxnSpPr>
         <p:spPr>
           <a:xfrm>
-            <a:off x="2434538" y="2297475"/>
-            <a:ext cx="1202874" cy="483255"/>
+            <a:off x="2434538" y="2094275"/>
+            <a:ext cx="1797234" cy="302280"/>
           </a:xfrm>
           <a:prstGeom prst="bentConnector2">
             <a:avLst/>
@@ -4757,23 +6176,24 @@
       </p:cxnSp>
       <p:cxnSp>
         <p:nvCxnSpPr>
-          <p:cNvPr id="183" name="Connector: Elbow 182">
-            <a:extLst>
-              <a:ext uri="{FF2B5EF4-FFF2-40B4-BE49-F238E27FC236}">
-                <a16:creationId xmlns:a16="http://schemas.microsoft.com/office/drawing/2014/main" id="{CB987B39-A744-C55F-EA5F-5765766EEE46}"/>
+          <p:cNvPr id="20" name="Connector: Elbow 19">
+            <a:extLst>
+              <a:ext uri="{FF2B5EF4-FFF2-40B4-BE49-F238E27FC236}">
+                <a16:creationId xmlns:a16="http://schemas.microsoft.com/office/drawing/2014/main" id="{F43A1ED0-D187-E31D-C7F7-5A593F997C74}"/>
               </a:ext>
             </a:extLst>
           </p:cNvPr>
           <p:cNvCxnSpPr>
             <a:cxnSpLocks/>
-            <a:endCxn id="180" idx="0"/>
+            <a:stCxn id="17" idx="3"/>
+            <a:endCxn id="34" idx="0"/>
           </p:cNvCxnSpPr>
           <p:nvPr/>
         </p:nvCxnSpPr>
         <p:spPr>
           <a:xfrm>
-            <a:off x="6587394" y="4409612"/>
-            <a:ext cx="1081973" cy="473006"/>
+            <a:off x="6951884" y="3844462"/>
+            <a:ext cx="966403" cy="320606"/>
           </a:xfrm>
           <a:prstGeom prst="bentConnector2">
             <a:avLst/>
@@ -4802,71 +6222,23 @@
       </p:cxnSp>
       <p:cxnSp>
         <p:nvCxnSpPr>
-          <p:cNvPr id="185" name="Connector: Elbow 184">
-            <a:extLst>
-              <a:ext uri="{FF2B5EF4-FFF2-40B4-BE49-F238E27FC236}">
-                <a16:creationId xmlns:a16="http://schemas.microsoft.com/office/drawing/2014/main" id="{1537E0AF-ECE8-2C60-C693-DB654330F524}"/>
+          <p:cNvPr id="21" name="Connector: Elbow 20">
+            <a:extLst>
+              <a:ext uri="{FF2B5EF4-FFF2-40B4-BE49-F238E27FC236}">
+                <a16:creationId xmlns:a16="http://schemas.microsoft.com/office/drawing/2014/main" id="{ABA29F4E-2289-789E-F914-63B4E55DA08D}"/>
               </a:ext>
             </a:extLst>
           </p:cNvPr>
           <p:cNvCxnSpPr>
             <a:cxnSpLocks/>
-            <a:stCxn id="179" idx="2"/>
-            <a:endCxn id="208" idx="2"/>
-          </p:cNvCxnSpPr>
-          <p:nvPr/>
-        </p:nvCxnSpPr>
-        <p:spPr>
-          <a:xfrm rot="5400000" flipH="1">
-            <a:off x="2257937" y="1530584"/>
-            <a:ext cx="2095895" cy="4807791"/>
-          </a:xfrm>
-          <a:prstGeom prst="bentConnector3">
-            <a:avLst>
-              <a:gd name="adj1" fmla="val -10907"/>
-            </a:avLst>
-          </a:prstGeom>
-          <a:ln w="38100">
-            <a:solidFill>
-              <a:srgbClr val="DD5129"/>
-            </a:solidFill>
-            <a:tailEnd type="triangle"/>
-          </a:ln>
-        </p:spPr>
-        <p:style>
-          <a:lnRef idx="1">
-            <a:schemeClr val="accent1"/>
-          </a:lnRef>
-          <a:fillRef idx="0">
-            <a:schemeClr val="accent1"/>
-          </a:fillRef>
-          <a:effectRef idx="0">
-            <a:schemeClr val="accent1"/>
-          </a:effectRef>
-          <a:fontRef idx="minor">
-            <a:schemeClr val="tx1"/>
-          </a:fontRef>
-        </p:style>
-      </p:cxnSp>
-      <p:cxnSp>
-        <p:nvCxnSpPr>
-          <p:cNvPr id="186" name="Connector: Elbow 185">
-            <a:extLst>
-              <a:ext uri="{FF2B5EF4-FFF2-40B4-BE49-F238E27FC236}">
-                <a16:creationId xmlns:a16="http://schemas.microsoft.com/office/drawing/2014/main" id="{84162B16-F635-2A8A-FEBE-2B2E4E7C797C}"/>
-              </a:ext>
-            </a:extLst>
-          </p:cNvPr>
-          <p:cNvCxnSpPr>
-            <a:cxnSpLocks/>
-            <a:endCxn id="192" idx="2"/>
+            <a:endCxn id="31" idx="2"/>
           </p:cNvCxnSpPr>
           <p:nvPr/>
         </p:nvCxnSpPr>
         <p:spPr>
           <a:xfrm rot="10800000">
-            <a:off x="3029759" y="3926358"/>
-            <a:ext cx="3761702" cy="1890062"/>
+            <a:off x="3660802" y="3542184"/>
+            <a:ext cx="1525767" cy="585399"/>
           </a:xfrm>
           <a:prstGeom prst="bentConnector2">
             <a:avLst/>
@@ -4895,28 +6267,28 @@
       </p:cxnSp>
       <p:cxnSp>
         <p:nvCxnSpPr>
-          <p:cNvPr id="187" name="Connector: Elbow 186">
-            <a:extLst>
-              <a:ext uri="{FF2B5EF4-FFF2-40B4-BE49-F238E27FC236}">
-                <a16:creationId xmlns:a16="http://schemas.microsoft.com/office/drawing/2014/main" id="{F55EE938-01BB-17C0-6DAD-6BC2E616FD67}"/>
+          <p:cNvPr id="22" name="Connector: Elbow 21">
+            <a:extLst>
+              <a:ext uri="{FF2B5EF4-FFF2-40B4-BE49-F238E27FC236}">
+                <a16:creationId xmlns:a16="http://schemas.microsoft.com/office/drawing/2014/main" id="{5EF5DDFD-D360-0AE3-54CD-B26E95881D87}"/>
               </a:ext>
             </a:extLst>
           </p:cNvPr>
           <p:cNvCxnSpPr>
             <a:cxnSpLocks/>
-            <a:stCxn id="180" idx="2"/>
-            <a:endCxn id="208" idx="2"/>
+            <a:stCxn id="17" idx="2"/>
+            <a:endCxn id="16" idx="2"/>
           </p:cNvCxnSpPr>
           <p:nvPr/>
         </p:nvCxnSpPr>
         <p:spPr>
           <a:xfrm rot="5400000" flipH="1">
-            <a:off x="2714820" y="1073700"/>
-            <a:ext cx="3141715" cy="6767378"/>
+            <a:off x="2940503" y="1283510"/>
+            <a:ext cx="1750187" cy="4517346"/>
           </a:xfrm>
           <a:prstGeom prst="bentConnector3">
             <a:avLst>
-              <a:gd name="adj1" fmla="val -7276"/>
+              <a:gd name="adj1" fmla="val -4898"/>
             </a:avLst>
           </a:prstGeom>
           <a:ln w="38100">
@@ -4941,14 +6313,107 @@
           </a:fontRef>
         </p:style>
       </p:cxnSp>
+      <p:cxnSp>
+        <p:nvCxnSpPr>
+          <p:cNvPr id="23" name="Connector: Elbow 22">
+            <a:extLst>
+              <a:ext uri="{FF2B5EF4-FFF2-40B4-BE49-F238E27FC236}">
+                <a16:creationId xmlns:a16="http://schemas.microsoft.com/office/drawing/2014/main" id="{67ACA711-CE5D-7B35-A0E5-AC9969695754}"/>
+              </a:ext>
+            </a:extLst>
+          </p:cNvPr>
+          <p:cNvCxnSpPr>
+            <a:cxnSpLocks/>
+            <a:endCxn id="31" idx="2"/>
+          </p:cNvCxnSpPr>
+          <p:nvPr/>
+        </p:nvCxnSpPr>
+        <p:spPr>
+          <a:xfrm rot="10800000">
+            <a:off x="3660802" y="3542183"/>
+            <a:ext cx="3393599" cy="1651938"/>
+          </a:xfrm>
+          <a:prstGeom prst="bentConnector2">
+            <a:avLst/>
+          </a:prstGeom>
+          <a:ln w="38100">
+            <a:solidFill>
+              <a:srgbClr val="0F7BA2"/>
+            </a:solidFill>
+            <a:tailEnd type="triangle"/>
+          </a:ln>
+        </p:spPr>
+        <p:style>
+          <a:lnRef idx="1">
+            <a:schemeClr val="accent1"/>
+          </a:lnRef>
+          <a:fillRef idx="0">
+            <a:schemeClr val="accent1"/>
+          </a:fillRef>
+          <a:effectRef idx="0">
+            <a:schemeClr val="accent1"/>
+          </a:effectRef>
+          <a:fontRef idx="minor">
+            <a:schemeClr val="tx1"/>
+          </a:fontRef>
+        </p:style>
+      </p:cxnSp>
+      <p:cxnSp>
+        <p:nvCxnSpPr>
+          <p:cNvPr id="24" name="Connector: Elbow 23">
+            <a:extLst>
+              <a:ext uri="{FF2B5EF4-FFF2-40B4-BE49-F238E27FC236}">
+                <a16:creationId xmlns:a16="http://schemas.microsoft.com/office/drawing/2014/main" id="{B29459D5-37C5-62E2-DC4F-B027F5915287}"/>
+              </a:ext>
+            </a:extLst>
+          </p:cNvPr>
+          <p:cNvCxnSpPr>
+            <a:cxnSpLocks/>
+            <a:stCxn id="34" idx="2"/>
+            <a:endCxn id="16" idx="2"/>
+          </p:cNvCxnSpPr>
+          <p:nvPr/>
+        </p:nvCxnSpPr>
+        <p:spPr>
+          <a:xfrm rot="5400000" flipH="1">
+            <a:off x="3415802" y="808212"/>
+            <a:ext cx="2643607" cy="6361363"/>
+          </a:xfrm>
+          <a:prstGeom prst="bentConnector3">
+            <a:avLst>
+              <a:gd name="adj1" fmla="val -8647"/>
+            </a:avLst>
+          </a:prstGeom>
+          <a:ln w="38100">
+            <a:solidFill>
+              <a:srgbClr val="DD5129"/>
+            </a:solidFill>
+            <a:tailEnd type="triangle"/>
+          </a:ln>
+        </p:spPr>
+        <p:style>
+          <a:lnRef idx="1">
+            <a:schemeClr val="accent1"/>
+          </a:lnRef>
+          <a:fillRef idx="0">
+            <a:schemeClr val="accent1"/>
+          </a:fillRef>
+          <a:effectRef idx="0">
+            <a:schemeClr val="accent1"/>
+          </a:effectRef>
+          <a:fontRef idx="minor">
+            <a:schemeClr val="tx1"/>
+          </a:fontRef>
+        </p:style>
+      </p:cxnSp>
       <mc:AlternateContent xmlns:mc="http://schemas.openxmlformats.org/markup-compatibility/2006">
         <mc:Choice xmlns:a14="http://schemas.microsoft.com/office/drawing/2010/main" Requires="a14">
           <p:sp>
             <p:nvSpPr>
-              <p:cNvPr id="188" name="TextBox 187">
+              <p:cNvPr id="25" name="TextBox 24">
                 <a:extLst>
                   <a:ext uri="{FF2B5EF4-FFF2-40B4-BE49-F238E27FC236}">
-                    <a16:creationId xmlns:a16="http://schemas.microsoft.com/office/drawing/2014/main" id="{063CBE99-FC6E-7724-9064-1FAB1710B6CE}"/>
+                    <a16:creationId xmlns:a16="http://schemas.microsoft.com/office/drawing/2014/main" id="{F6390346-640C-F9E1-1B18-A8721C7EECFC}"/>
                   </a:ext>
                 </a:extLst>
               </p:cNvPr>
@@ -4957,7 +6422,7 @@
             </p:nvSpPr>
             <p:spPr>
               <a:xfrm>
-                <a:off x="2761092" y="1973899"/>
+                <a:off x="3058272" y="1751939"/>
                 <a:ext cx="549766" cy="296556"/>
               </a:xfrm>
               <a:prstGeom prst="rect">
@@ -5039,10 +6504,10 @@
         <mc:Fallback>
           <p:sp>
             <p:nvSpPr>
-              <p:cNvPr id="188" name="TextBox 187">
+              <p:cNvPr id="25" name="TextBox 24">
                 <a:extLst>
                   <a:ext uri="{FF2B5EF4-FFF2-40B4-BE49-F238E27FC236}">
-                    <a16:creationId xmlns:a16="http://schemas.microsoft.com/office/drawing/2014/main" id="{063CBE99-FC6E-7724-9064-1FAB1710B6CE}"/>
+                    <a16:creationId xmlns:a16="http://schemas.microsoft.com/office/drawing/2014/main" id="{F6390346-640C-F9E1-1B18-A8721C7EECFC}"/>
                   </a:ext>
                 </a:extLst>
               </p:cNvPr>
@@ -5053,7 +6518,7 @@
             </p:nvSpPr>
             <p:spPr>
               <a:xfrm>
-                <a:off x="2761092" y="1973899"/>
+                <a:off x="3058272" y="1751939"/>
                 <a:ext cx="549766" cy="296556"/>
               </a:xfrm>
               <a:prstGeom prst="rect">
@@ -5062,7 +6527,7 @@
               <a:blipFill>
                 <a:blip r:embed="rId9"/>
                 <a:stretch>
-                  <a:fillRect l="-11111" r="-7778" b="-27083"/>
+                  <a:fillRect l="-11111" r="-7778" b="-24490"/>
                 </a:stretch>
               </a:blipFill>
             </p:spPr>
@@ -5085,10 +6550,10 @@
         <mc:Choice xmlns:a14="http://schemas.microsoft.com/office/drawing/2010/main" Requires="a14">
           <p:sp>
             <p:nvSpPr>
-              <p:cNvPr id="189" name="TextBox 188">
+              <p:cNvPr id="26" name="TextBox 25">
                 <a:extLst>
                   <a:ext uri="{FF2B5EF4-FFF2-40B4-BE49-F238E27FC236}">
-                    <a16:creationId xmlns:a16="http://schemas.microsoft.com/office/drawing/2014/main" id="{CB98D8FE-D2AE-2F30-8F04-641A6784F277}"/>
+                    <a16:creationId xmlns:a16="http://schemas.microsoft.com/office/drawing/2014/main" id="{80BFC186-BFDD-7C87-489C-71742EBB82D2}"/>
                   </a:ext>
                 </a:extLst>
               </p:cNvPr>
@@ -5097,7 +6562,7 @@
             </p:nvSpPr>
             <p:spPr>
               <a:xfrm>
-                <a:off x="4825068" y="2994113"/>
+                <a:off x="5356059" y="2677308"/>
                 <a:ext cx="498470" cy="276999"/>
               </a:xfrm>
               <a:prstGeom prst="rect">
@@ -5179,10 +6644,10 @@
         <mc:Fallback>
           <p:sp>
             <p:nvSpPr>
-              <p:cNvPr id="189" name="TextBox 188">
+              <p:cNvPr id="26" name="TextBox 25">
                 <a:extLst>
                   <a:ext uri="{FF2B5EF4-FFF2-40B4-BE49-F238E27FC236}">
-                    <a16:creationId xmlns:a16="http://schemas.microsoft.com/office/drawing/2014/main" id="{CB98D8FE-D2AE-2F30-8F04-641A6784F277}"/>
+                    <a16:creationId xmlns:a16="http://schemas.microsoft.com/office/drawing/2014/main" id="{80BFC186-BFDD-7C87-489C-71742EBB82D2}"/>
                   </a:ext>
                 </a:extLst>
               </p:cNvPr>
@@ -5193,7 +6658,7 @@
             </p:nvSpPr>
             <p:spPr>
               <a:xfrm>
-                <a:off x="4825068" y="2994113"/>
+                <a:off x="5356059" y="2677308"/>
                 <a:ext cx="498470" cy="276999"/>
               </a:xfrm>
               <a:prstGeom prst="rect">
@@ -5225,10 +6690,10 @@
         <mc:Choice xmlns:a14="http://schemas.microsoft.com/office/drawing/2010/main" Requires="a14">
           <p:sp>
             <p:nvSpPr>
-              <p:cNvPr id="190" name="TextBox 189">
+              <p:cNvPr id="27" name="TextBox 26">
                 <a:extLst>
                   <a:ext uri="{FF2B5EF4-FFF2-40B4-BE49-F238E27FC236}">
-                    <a16:creationId xmlns:a16="http://schemas.microsoft.com/office/drawing/2014/main" id="{BBDBD5D9-1909-2DD8-ADF9-4E48CF632528}"/>
+                    <a16:creationId xmlns:a16="http://schemas.microsoft.com/office/drawing/2014/main" id="{80487CE1-0A67-FFFC-50DE-B91D8F82198C}"/>
                   </a:ext>
                 </a:extLst>
               </p:cNvPr>
@@ -5237,7 +6702,7 @@
             </p:nvSpPr>
             <p:spPr>
               <a:xfrm>
-                <a:off x="924709" y="3234215"/>
+                <a:off x="1540611" y="3036511"/>
                 <a:ext cx="1829860" cy="276999"/>
               </a:xfrm>
               <a:prstGeom prst="rect">
@@ -5359,10 +6824,10 @@
         <mc:Fallback>
           <p:sp>
             <p:nvSpPr>
-              <p:cNvPr id="190" name="TextBox 189">
+              <p:cNvPr id="27" name="TextBox 26">
                 <a:extLst>
                   <a:ext uri="{FF2B5EF4-FFF2-40B4-BE49-F238E27FC236}">
-                    <a16:creationId xmlns:a16="http://schemas.microsoft.com/office/drawing/2014/main" id="{BBDBD5D9-1909-2DD8-ADF9-4E48CF632528}"/>
+                    <a16:creationId xmlns:a16="http://schemas.microsoft.com/office/drawing/2014/main" id="{80487CE1-0A67-FFFC-50DE-B91D8F82198C}"/>
                   </a:ext>
                 </a:extLst>
               </p:cNvPr>
@@ -5373,7 +6838,7 @@
             </p:nvSpPr>
             <p:spPr>
               <a:xfrm>
-                <a:off x="924709" y="3234215"/>
+                <a:off x="1540611" y="3036511"/>
                 <a:ext cx="1829860" cy="276999"/>
               </a:xfrm>
               <a:prstGeom prst="rect">
@@ -5382,7 +6847,7 @@
               <a:blipFill>
                 <a:blip r:embed="rId11"/>
                 <a:stretch>
-                  <a:fillRect r="-1000" b="-26667"/>
+                  <a:fillRect r="-1000" b="-23913"/>
                 </a:stretch>
               </a:blipFill>
             </p:spPr>
@@ -5405,10 +6870,10 @@
         <mc:Choice xmlns:a14="http://schemas.microsoft.com/office/drawing/2010/main" Requires="a14">
           <p:sp>
             <p:nvSpPr>
-              <p:cNvPr id="191" name="TextBox 190">
+              <p:cNvPr id="28" name="TextBox 27">
                 <a:extLst>
                   <a:ext uri="{FF2B5EF4-FFF2-40B4-BE49-F238E27FC236}">
-                    <a16:creationId xmlns:a16="http://schemas.microsoft.com/office/drawing/2014/main" id="{94AB9290-F425-FAA8-E9F6-11EF435CB271}"/>
+                    <a16:creationId xmlns:a16="http://schemas.microsoft.com/office/drawing/2014/main" id="{2C49B049-7687-6E42-17B4-3C426B25CAE4}"/>
                   </a:ext>
                 </a:extLst>
               </p:cNvPr>
@@ -5417,7 +6882,7 @@
             </p:nvSpPr>
             <p:spPr>
               <a:xfrm>
-                <a:off x="6862089" y="4112268"/>
+                <a:off x="7168794" y="3566168"/>
                 <a:ext cx="532582" cy="276999"/>
               </a:xfrm>
               <a:prstGeom prst="rect">
@@ -5499,10 +6964,10 @@
         <mc:Fallback>
           <p:sp>
             <p:nvSpPr>
-              <p:cNvPr id="191" name="TextBox 190">
+              <p:cNvPr id="28" name="TextBox 27">
                 <a:extLst>
                   <a:ext uri="{FF2B5EF4-FFF2-40B4-BE49-F238E27FC236}">
-                    <a16:creationId xmlns:a16="http://schemas.microsoft.com/office/drawing/2014/main" id="{94AB9290-F425-FAA8-E9F6-11EF435CB271}"/>
+                    <a16:creationId xmlns:a16="http://schemas.microsoft.com/office/drawing/2014/main" id="{2C49B049-7687-6E42-17B4-3C426B25CAE4}"/>
                   </a:ext>
                 </a:extLst>
               </p:cNvPr>
@@ -5513,7 +6978,7 @@
             </p:nvSpPr>
             <p:spPr>
               <a:xfrm>
-                <a:off x="6862089" y="4112268"/>
+                <a:off x="7168794" y="3566168"/>
                 <a:ext cx="532582" cy="276999"/>
               </a:xfrm>
               <a:prstGeom prst="rect">
@@ -5541,64 +7006,223 @@
           </p:sp>
         </mc:Fallback>
       </mc:AlternateContent>
-      <p:sp>
-        <p:nvSpPr>
-          <p:cNvPr id="192" name="Rectangle 191">
-            <a:extLst>
-              <a:ext uri="{FF2B5EF4-FFF2-40B4-BE49-F238E27FC236}">
-                <a16:creationId xmlns:a16="http://schemas.microsoft.com/office/drawing/2014/main" id="{9011F9A0-56CD-C9EB-DDB3-F5B865897035}"/>
-              </a:ext>
-            </a:extLst>
-          </p:cNvPr>
-          <p:cNvSpPr/>
+      <p:grpSp>
+        <p:nvGrpSpPr>
+          <p:cNvPr id="29" name="Group 28">
+            <a:extLst>
+              <a:ext uri="{FF2B5EF4-FFF2-40B4-BE49-F238E27FC236}">
+                <a16:creationId xmlns:a16="http://schemas.microsoft.com/office/drawing/2014/main" id="{A8F29138-6CC6-84ED-6AEB-1C03202A27F3}"/>
+              </a:ext>
+            </a:extLst>
+          </p:cNvPr>
+          <p:cNvGrpSpPr/>
           <p:nvPr/>
-        </p:nvSpPr>
-        <p:spPr>
+        </p:nvGrpSpPr>
+        <p:grpSpPr>
           <a:xfrm>
-            <a:off x="2579045" y="3537469"/>
-            <a:ext cx="901427" cy="388889"/>
+            <a:off x="3345194" y="2396555"/>
+            <a:ext cx="1764192" cy="1145628"/>
+            <a:chOff x="3345194" y="3055050"/>
+            <a:chExt cx="1764192" cy="1145628"/>
           </a:xfrm>
-          <a:prstGeom prst="rect">
-            <a:avLst/>
-          </a:prstGeom>
-          <a:noFill/>
-          <a:ln w="38100">
+        </p:grpSpPr>
+        <mc:AlternateContent xmlns:mc="http://schemas.openxmlformats.org/markup-compatibility/2006">
+          <mc:Choice xmlns:a14="http://schemas.microsoft.com/office/drawing/2010/main" Requires="a14">
+            <p:sp>
+              <p:nvSpPr>
+                <p:cNvPr id="30" name="Rectangle: Rounded Corners 29">
+                  <a:extLst>
+                    <a:ext uri="{FF2B5EF4-FFF2-40B4-BE49-F238E27FC236}">
+                      <a16:creationId xmlns:a16="http://schemas.microsoft.com/office/drawing/2014/main" id="{9D98F3E3-E5BB-1B5C-D272-EC87F35C925A}"/>
+                    </a:ext>
+                  </a:extLst>
+                </p:cNvPr>
+                <p:cNvSpPr/>
+                <p:nvPr/>
+              </p:nvSpPr>
+              <p:spPr>
+                <a:xfrm>
+                  <a:off x="3354158" y="3055050"/>
+                  <a:ext cx="1755228" cy="1145628"/>
+                </a:xfrm>
+                <a:prstGeom prst="roundRect">
+                  <a:avLst/>
+                </a:prstGeom>
+                <a:noFill/>
+                <a:ln w="38100">
+                  <a:solidFill>
+                    <a:schemeClr val="tx1"/>
+                  </a:solidFill>
+                </a:ln>
+              </p:spPr>
+              <p:style>
+                <a:lnRef idx="2">
+                  <a:schemeClr val="accent1">
+                    <a:shade val="15000"/>
+                  </a:schemeClr>
+                </a:lnRef>
+                <a:fillRef idx="1">
+                  <a:schemeClr val="accent1"/>
+                </a:fillRef>
+                <a:effectRef idx="0">
+                  <a:schemeClr val="accent1"/>
+                </a:effectRef>
+                <a:fontRef idx="minor">
+                  <a:schemeClr val="lt1"/>
+                </a:fontRef>
+              </p:style>
+              <p:txBody>
+                <a:bodyPr rtlCol="0" anchor="ctr"/>
+                <a:lstStyle/>
+                <a:p>
+                  <a:pPr algn="ctr"/>
+                  <a14:m>
+                    <m:oMathPara xmlns:m="http://schemas.openxmlformats.org/officeDocument/2006/math">
+                      <m:oMathParaPr>
+                        <m:jc m:val="centerGroup"/>
+                      </m:oMathParaPr>
+                      <m:oMath xmlns:m="http://schemas.openxmlformats.org/officeDocument/2006/math">
+                        <m:r>
+                          <a:rPr lang="en-US" sz="3200" b="0" i="1" smtClean="0">
+                            <a:solidFill>
+                              <a:schemeClr val="tx1"/>
+                            </a:solidFill>
+                            <a:latin typeface="Cambria Math" panose="02040503050406030204" pitchFamily="18" charset="0"/>
+                          </a:rPr>
+                          <m:t>𝐿</m:t>
+                        </m:r>
+                      </m:oMath>
+                    </m:oMathPara>
+                  </a14:m>
+                  <a:endParaRPr lang="en-US" sz="3200" dirty="0">
+                    <a:solidFill>
+                      <a:schemeClr val="tx1"/>
+                    </a:solidFill>
+                  </a:endParaRPr>
+                </a:p>
+                <a:p>
+                  <a:pPr algn="ctr"/>
+                  <a:r>
+                    <a:rPr lang="en-US" sz="1600" dirty="0">
+                      <a:solidFill>
+                        <a:schemeClr val="tx1"/>
+                      </a:solidFill>
+                    </a:rPr>
+                    <a:t>Landing</a:t>
+                  </a:r>
+                </a:p>
+              </p:txBody>
+            </p:sp>
+          </mc:Choice>
+          <mc:Fallback>
+            <p:sp>
+              <p:nvSpPr>
+                <p:cNvPr id="30" name="Rectangle: Rounded Corners 29">
+                  <a:extLst>
+                    <a:ext uri="{FF2B5EF4-FFF2-40B4-BE49-F238E27FC236}">
+                      <a16:creationId xmlns:a16="http://schemas.microsoft.com/office/drawing/2014/main" id="{9D98F3E3-E5BB-1B5C-D272-EC87F35C925A}"/>
+                    </a:ext>
+                  </a:extLst>
+                </p:cNvPr>
+                <p:cNvSpPr>
+                  <a:spLocks noRot="1" noChangeAspect="1" noMove="1" noResize="1" noEditPoints="1" noAdjustHandles="1" noChangeArrowheads="1" noChangeShapeType="1" noTextEdit="1"/>
+                </p:cNvSpPr>
+                <p:nvPr/>
+              </p:nvSpPr>
+              <p:spPr>
+                <a:xfrm>
+                  <a:off x="3354158" y="3055050"/>
+                  <a:ext cx="1755228" cy="1145628"/>
+                </a:xfrm>
+                <a:prstGeom prst="roundRect">
+                  <a:avLst/>
+                </a:prstGeom>
+                <a:blipFill>
+                  <a:blip r:embed="rId13"/>
+                  <a:stretch>
+                    <a:fillRect/>
+                  </a:stretch>
+                </a:blipFill>
+                <a:ln w="38100">
+                  <a:solidFill>
+                    <a:schemeClr val="tx1"/>
+                  </a:solidFill>
+                </a:ln>
+              </p:spPr>
+              <p:txBody>
+                <a:bodyPr/>
+                <a:lstStyle/>
+                <a:p>
+                  <a:r>
+                    <a:rPr lang="en-US">
+                      <a:noFill/>
+                    </a:rPr>
+                    <a:t> </a:t>
+                  </a:r>
+                </a:p>
+              </p:txBody>
+            </p:sp>
+          </mc:Fallback>
+        </mc:AlternateContent>
+        <p:sp>
+          <p:nvSpPr>
+            <p:cNvPr id="31" name="Rectangle 30">
+              <a:extLst>
+                <a:ext uri="{FF2B5EF4-FFF2-40B4-BE49-F238E27FC236}">
+                  <a16:creationId xmlns:a16="http://schemas.microsoft.com/office/drawing/2014/main" id="{1B92200F-277D-5A69-B875-4DB81077EB40}"/>
+                </a:ext>
+              </a:extLst>
+            </p:cNvPr>
+            <p:cNvSpPr/>
+            <p:nvPr/>
+          </p:nvSpPr>
+          <p:spPr>
+            <a:xfrm>
+              <a:off x="3345194" y="3811789"/>
+              <a:ext cx="631213" cy="388889"/>
+            </a:xfrm>
+            <a:prstGeom prst="rect">
+              <a:avLst/>
+            </a:prstGeom>
             <a:noFill/>
-          </a:ln>
-        </p:spPr>
-        <p:style>
-          <a:lnRef idx="2">
-            <a:schemeClr val="accent1">
-              <a:shade val="15000"/>
-            </a:schemeClr>
-          </a:lnRef>
-          <a:fillRef idx="1">
-            <a:schemeClr val="accent1"/>
-          </a:fillRef>
-          <a:effectRef idx="0">
-            <a:schemeClr val="accent1"/>
-          </a:effectRef>
-          <a:fontRef idx="minor">
-            <a:schemeClr val="lt1"/>
-          </a:fontRef>
-        </p:style>
-        <p:txBody>
-          <a:bodyPr rtlCol="0" anchor="ctr"/>
-          <a:lstStyle/>
-          <a:p>
-            <a:pPr algn="ctr"/>
-            <a:endParaRPr lang="en-US"/>
-          </a:p>
-        </p:txBody>
-      </p:sp>
+            <a:ln w="38100">
+              <a:noFill/>
+            </a:ln>
+          </p:spPr>
+          <p:style>
+            <a:lnRef idx="2">
+              <a:schemeClr val="accent1">
+                <a:shade val="15000"/>
+              </a:schemeClr>
+            </a:lnRef>
+            <a:fillRef idx="1">
+              <a:schemeClr val="accent1"/>
+            </a:fillRef>
+            <a:effectRef idx="0">
+              <a:schemeClr val="accent1"/>
+            </a:effectRef>
+            <a:fontRef idx="minor">
+              <a:schemeClr val="lt1"/>
+            </a:fontRef>
+          </p:style>
+          <p:txBody>
+            <a:bodyPr rtlCol="0" anchor="ctr"/>
+            <a:lstStyle/>
+            <a:p>
+              <a:pPr algn="ctr"/>
+              <a:endParaRPr lang="en-US"/>
+            </a:p>
+          </p:txBody>
+        </p:sp>
+      </p:grpSp>
       <mc:AlternateContent xmlns:mc="http://schemas.openxmlformats.org/markup-compatibility/2006">
         <mc:Choice xmlns:a14="http://schemas.microsoft.com/office/drawing/2010/main" Requires="a14">
           <p:sp>
             <p:nvSpPr>
-              <p:cNvPr id="193" name="TextBox 192">
+              <p:cNvPr id="32" name="TextBox 31">
                 <a:extLst>
                   <a:ext uri="{FF2B5EF4-FFF2-40B4-BE49-F238E27FC236}">
-                    <a16:creationId xmlns:a16="http://schemas.microsoft.com/office/drawing/2014/main" id="{F2C5D60F-2BDA-01F1-5F75-30C1803DB656}"/>
+                    <a16:creationId xmlns:a16="http://schemas.microsoft.com/office/drawing/2014/main" id="{7674C523-B166-42F3-5F95-FE2B8093588A}"/>
                   </a:ext>
                 </a:extLst>
               </p:cNvPr>
@@ -5607,7 +7231,7 @@
             </p:nvSpPr>
             <p:spPr>
               <a:xfrm>
-                <a:off x="3285637" y="4274828"/>
+                <a:off x="3736379" y="3818066"/>
                 <a:ext cx="1268424" cy="276999"/>
               </a:xfrm>
               <a:prstGeom prst="rect">
@@ -5712,10 +7336,10 @@
         <mc:Fallback>
           <p:sp>
             <p:nvSpPr>
-              <p:cNvPr id="193" name="TextBox 192">
+              <p:cNvPr id="32" name="TextBox 31">
                 <a:extLst>
                   <a:ext uri="{FF2B5EF4-FFF2-40B4-BE49-F238E27FC236}">
-                    <a16:creationId xmlns:a16="http://schemas.microsoft.com/office/drawing/2014/main" id="{F2C5D60F-2BDA-01F1-5F75-30C1803DB656}"/>
+                    <a16:creationId xmlns:a16="http://schemas.microsoft.com/office/drawing/2014/main" id="{7674C523-B166-42F3-5F95-FE2B8093588A}"/>
                   </a:ext>
                 </a:extLst>
               </p:cNvPr>
@@ -5726,14 +7350,14 @@
             </p:nvSpPr>
             <p:spPr>
               <a:xfrm>
-                <a:off x="3285637" y="4274828"/>
+                <a:off x="3736379" y="3818066"/>
                 <a:ext cx="1268424" cy="276999"/>
               </a:xfrm>
               <a:prstGeom prst="rect">
                 <a:avLst/>
               </a:prstGeom>
               <a:blipFill>
-                <a:blip r:embed="rId13"/>
+                <a:blip r:embed="rId14"/>
                 <a:stretch>
                   <a:fillRect l="-2404" r="-1442" b="-23913"/>
                 </a:stretch>
@@ -5758,10 +7382,10 @@
         <mc:Choice xmlns:a14="http://schemas.microsoft.com/office/drawing/2010/main" Requires="a14">
           <p:sp>
             <p:nvSpPr>
-              <p:cNvPr id="194" name="TextBox 193">
+              <p:cNvPr id="33" name="TextBox 32">
                 <a:extLst>
                   <a:ext uri="{FF2B5EF4-FFF2-40B4-BE49-F238E27FC236}">
-                    <a16:creationId xmlns:a16="http://schemas.microsoft.com/office/drawing/2014/main" id="{0733128A-E480-B464-41C7-FE666FB0D2EB}"/>
+                    <a16:creationId xmlns:a16="http://schemas.microsoft.com/office/drawing/2014/main" id="{522FBB10-ABC6-05CE-7815-F8C8E737568C}"/>
                   </a:ext>
                 </a:extLst>
               </p:cNvPr>
@@ -5770,7 +7394,7 @@
             </p:nvSpPr>
             <p:spPr>
               <a:xfrm>
-                <a:off x="924709" y="4906600"/>
+                <a:off x="1543199" y="4131326"/>
                 <a:ext cx="1863972" cy="276999"/>
               </a:xfrm>
               <a:prstGeom prst="rect">
@@ -5892,10 +7516,10 @@
         <mc:Fallback>
           <p:sp>
             <p:nvSpPr>
-              <p:cNvPr id="194" name="TextBox 193">
+              <p:cNvPr id="33" name="TextBox 32">
                 <a:extLst>
                   <a:ext uri="{FF2B5EF4-FFF2-40B4-BE49-F238E27FC236}">
-                    <a16:creationId xmlns:a16="http://schemas.microsoft.com/office/drawing/2014/main" id="{0733128A-E480-B464-41C7-FE666FB0D2EB}"/>
+                    <a16:creationId xmlns:a16="http://schemas.microsoft.com/office/drawing/2014/main" id="{522FBB10-ABC6-05CE-7815-F8C8E737568C}"/>
                   </a:ext>
                 </a:extLst>
               </p:cNvPr>
@@ -5906,16 +7530,16 @@
             </p:nvSpPr>
             <p:spPr>
               <a:xfrm>
-                <a:off x="924709" y="4906600"/>
+                <a:off x="1543199" y="4131326"/>
                 <a:ext cx="1863972" cy="276999"/>
               </a:xfrm>
               <a:prstGeom prst="rect">
                 <a:avLst/>
               </a:prstGeom>
               <a:blipFill>
-                <a:blip r:embed="rId14"/>
+                <a:blip r:embed="rId15"/>
                 <a:stretch>
-                  <a:fillRect r="-984" b="-26667"/>
+                  <a:fillRect r="-980" b="-26667"/>
                 </a:stretch>
               </a:blipFill>
             </p:spPr>
@@ -5934,64 +7558,152 @@
           </p:sp>
         </mc:Fallback>
       </mc:AlternateContent>
-      <p:sp>
-        <p:nvSpPr>
-          <p:cNvPr id="195" name="Rectangle 194">
-            <a:extLst>
-              <a:ext uri="{FF2B5EF4-FFF2-40B4-BE49-F238E27FC236}">
-                <a16:creationId xmlns:a16="http://schemas.microsoft.com/office/drawing/2014/main" id="{659EC861-2F84-980F-1F72-BBB8E05711A9}"/>
-              </a:ext>
-            </a:extLst>
-          </p:cNvPr>
-          <p:cNvSpPr/>
-          <p:nvPr/>
-        </p:nvSpPr>
-        <p:spPr>
-          <a:xfrm>
-            <a:off x="6785160" y="5621976"/>
-            <a:ext cx="901427" cy="388889"/>
-          </a:xfrm>
-          <a:prstGeom prst="rect">
-            <a:avLst/>
-          </a:prstGeom>
-          <a:noFill/>
-          <a:ln w="38100">
-            <a:noFill/>
-          </a:ln>
-        </p:spPr>
-        <p:style>
-          <a:lnRef idx="2">
-            <a:schemeClr val="accent1">
-              <a:shade val="15000"/>
-            </a:schemeClr>
-          </a:lnRef>
-          <a:fillRef idx="1">
-            <a:schemeClr val="accent1"/>
-          </a:fillRef>
-          <a:effectRef idx="0">
-            <a:schemeClr val="accent1"/>
-          </a:effectRef>
-          <a:fontRef idx="minor">
-            <a:schemeClr val="lt1"/>
-          </a:fontRef>
-        </p:style>
-        <p:txBody>
-          <a:bodyPr rtlCol="0" anchor="ctr"/>
-          <a:lstStyle/>
-          <a:p>
-            <a:pPr algn="ctr"/>
-            <a:endParaRPr lang="en-US"/>
-          </a:p>
-        </p:txBody>
-      </p:sp>
       <mc:AlternateContent xmlns:mc="http://schemas.openxmlformats.org/markup-compatibility/2006">
         <mc:Choice xmlns:a14="http://schemas.microsoft.com/office/drawing/2010/main" Requires="a14">
           <p:sp>
             <p:nvSpPr>
-              <p:cNvPr id="196" name="TextBox 195">
+              <p:cNvPr id="34" name="Rectangle: Rounded Corners 33">
                 <a:extLst>
                   <a:ext uri="{FF2B5EF4-FFF2-40B4-BE49-F238E27FC236}">
-                    <a16:creationId xmlns:a16="http://schemas.microsoft.com/office/drawing/2014/main" id="{F1B83A92-0CCA-7F82-6A9E-FB2CBA593BBD}"/>
+                    <a16:creationId xmlns:a16="http://schemas.microsoft.com/office/drawing/2014/main" id="{980C4270-BEF8-DF34-15FB-57F82FFE5677}"/>
+                  </a:ext>
+                </a:extLst>
+              </p:cNvPr>
+              <p:cNvSpPr/>
+              <p:nvPr/>
+            </p:nvSpPr>
+            <p:spPr>
+              <a:xfrm>
+                <a:off x="7040673" y="4165068"/>
+                <a:ext cx="1755228" cy="1145628"/>
+              </a:xfrm>
+              <a:prstGeom prst="roundRect">
+                <a:avLst/>
+              </a:prstGeom>
+              <a:noFill/>
+              <a:ln w="38100">
+                <a:solidFill>
+                  <a:schemeClr val="tx1"/>
+                </a:solidFill>
+              </a:ln>
+            </p:spPr>
+            <p:style>
+              <a:lnRef idx="2">
+                <a:schemeClr val="accent1">
+                  <a:shade val="15000"/>
+                </a:schemeClr>
+              </a:lnRef>
+              <a:fillRef idx="1">
+                <a:schemeClr val="accent1"/>
+              </a:fillRef>
+              <a:effectRef idx="0">
+                <a:schemeClr val="accent1"/>
+              </a:effectRef>
+              <a:fontRef idx="minor">
+                <a:schemeClr val="lt1"/>
+              </a:fontRef>
+            </p:style>
+            <p:txBody>
+              <a:bodyPr rtlCol="0" anchor="ctr"/>
+              <a:lstStyle/>
+              <a:p>
+                <a:pPr algn="ctr"/>
+                <a14:m>
+                  <m:oMathPara xmlns:m="http://schemas.openxmlformats.org/officeDocument/2006/math">
+                    <m:oMathParaPr>
+                      <m:jc m:val="centerGroup"/>
+                    </m:oMathParaPr>
+                    <m:oMath xmlns:m="http://schemas.openxmlformats.org/officeDocument/2006/math">
+                      <m:r>
+                        <a:rPr lang="en-US" sz="3200" b="0" i="1" smtClean="0">
+                          <a:solidFill>
+                            <a:schemeClr val="tx1"/>
+                          </a:solidFill>
+                          <a:latin typeface="Cambria Math" panose="02040503050406030204" pitchFamily="18" charset="0"/>
+                        </a:rPr>
+                        <m:t>𝐺</m:t>
+                      </m:r>
+                    </m:oMath>
+                  </m:oMathPara>
+                </a14:m>
+                <a:endParaRPr lang="en-US" sz="3200" dirty="0">
+                  <a:solidFill>
+                    <a:schemeClr val="tx1"/>
+                  </a:solidFill>
+                </a:endParaRPr>
+              </a:p>
+              <a:p>
+                <a:pPr algn="ctr"/>
+                <a:r>
+                  <a:rPr lang="en-US" sz="1600" dirty="0">
+                    <a:solidFill>
+                      <a:schemeClr val="tx1"/>
+                    </a:solidFill>
+                  </a:rPr>
+                  <a:t>Ingesting</a:t>
+                </a:r>
+              </a:p>
+            </p:txBody>
+          </p:sp>
+        </mc:Choice>
+        <mc:Fallback>
+          <p:sp>
+            <p:nvSpPr>
+              <p:cNvPr id="34" name="Rectangle: Rounded Corners 33">
+                <a:extLst>
+                  <a:ext uri="{FF2B5EF4-FFF2-40B4-BE49-F238E27FC236}">
+                    <a16:creationId xmlns:a16="http://schemas.microsoft.com/office/drawing/2014/main" id="{980C4270-BEF8-DF34-15FB-57F82FFE5677}"/>
+                  </a:ext>
+                </a:extLst>
+              </p:cNvPr>
+              <p:cNvSpPr>
+                <a:spLocks noRot="1" noChangeAspect="1" noMove="1" noResize="1" noEditPoints="1" noAdjustHandles="1" noChangeArrowheads="1" noChangeShapeType="1" noTextEdit="1"/>
+              </p:cNvSpPr>
+              <p:nvPr/>
+            </p:nvSpPr>
+            <p:spPr>
+              <a:xfrm>
+                <a:off x="7040673" y="4165068"/>
+                <a:ext cx="1755228" cy="1145628"/>
+              </a:xfrm>
+              <a:prstGeom prst="roundRect">
+                <a:avLst/>
+              </a:prstGeom>
+              <a:blipFill>
+                <a:blip r:embed="rId16"/>
+                <a:stretch>
+                  <a:fillRect/>
+                </a:stretch>
+              </a:blipFill>
+              <a:ln w="38100">
+                <a:solidFill>
+                  <a:schemeClr val="tx1"/>
+                </a:solidFill>
+              </a:ln>
+            </p:spPr>
+            <p:txBody>
+              <a:bodyPr/>
+              <a:lstStyle/>
+              <a:p>
+                <a:r>
+                  <a:rPr lang="en-US">
+                    <a:noFill/>
+                  </a:rPr>
+                  <a:t> </a:t>
+                </a:r>
+              </a:p>
+            </p:txBody>
+          </p:sp>
+        </mc:Fallback>
+      </mc:AlternateContent>
+      <mc:AlternateContent xmlns:mc="http://schemas.openxmlformats.org/markup-compatibility/2006">
+        <mc:Choice xmlns:a14="http://schemas.microsoft.com/office/drawing/2010/main" Requires="a14">
+          <p:sp>
+            <p:nvSpPr>
+              <p:cNvPr id="36" name="TextBox 35">
+                <a:extLst>
+                  <a:ext uri="{FF2B5EF4-FFF2-40B4-BE49-F238E27FC236}">
+                    <a16:creationId xmlns:a16="http://schemas.microsoft.com/office/drawing/2014/main" id="{8ABB4567-A1B2-5E87-24D9-0E53974D0F8B}"/>
                   </a:ext>
                 </a:extLst>
               </p:cNvPr>
@@ -6000,7 +7712,7 @@
             </p:nvSpPr>
             <p:spPr>
               <a:xfrm>
-                <a:off x="8214222" y="2890865"/>
+                <a:off x="8463405" y="2525740"/>
                 <a:ext cx="542713" cy="276999"/>
               </a:xfrm>
               <a:prstGeom prst="rect">
@@ -6082,10 +7794,10 @@
         <mc:Fallback>
           <p:sp>
             <p:nvSpPr>
-              <p:cNvPr id="196" name="TextBox 195">
+              <p:cNvPr id="36" name="TextBox 35">
                 <a:extLst>
                   <a:ext uri="{FF2B5EF4-FFF2-40B4-BE49-F238E27FC236}">
-                    <a16:creationId xmlns:a16="http://schemas.microsoft.com/office/drawing/2014/main" id="{F1B83A92-0CCA-7F82-6A9E-FB2CBA593BBD}"/>
+                    <a16:creationId xmlns:a16="http://schemas.microsoft.com/office/drawing/2014/main" id="{8ABB4567-A1B2-5E87-24D9-0E53974D0F8B}"/>
                   </a:ext>
                 </a:extLst>
               </p:cNvPr>
@@ -6096,16 +7808,16 @@
             </p:nvSpPr>
             <p:spPr>
               <a:xfrm>
-                <a:off x="8214222" y="2890865"/>
+                <a:off x="8463405" y="2525740"/>
                 <a:ext cx="542713" cy="276999"/>
               </a:xfrm>
               <a:prstGeom prst="rect">
                 <a:avLst/>
               </a:prstGeom>
               <a:blipFill>
-                <a:blip r:embed="rId15"/>
+                <a:blip r:embed="rId17"/>
                 <a:stretch>
-                  <a:fillRect l="-11111" r="-3333" b="-23913"/>
+                  <a:fillRect l="-11236" r="-4494" b="-23913"/>
                 </a:stretch>
               </a:blipFill>
             </p:spPr>
@@ -6128,10 +7840,10 @@
         <mc:Choice xmlns:a14="http://schemas.microsoft.com/office/drawing/2010/main" Requires="a14">
           <p:sp>
             <p:nvSpPr>
-              <p:cNvPr id="197" name="TextBox 196">
+              <p:cNvPr id="37" name="TextBox 36">
                 <a:extLst>
                   <a:ext uri="{FF2B5EF4-FFF2-40B4-BE49-F238E27FC236}">
-                    <a16:creationId xmlns:a16="http://schemas.microsoft.com/office/drawing/2014/main" id="{70E94BAA-91E2-B472-DF9A-C4BCC2932781}"/>
+                    <a16:creationId xmlns:a16="http://schemas.microsoft.com/office/drawing/2014/main" id="{069B0486-ABEA-2391-DEBB-D722F43E1A88}"/>
                   </a:ext>
                 </a:extLst>
               </p:cNvPr>
@@ -6140,7 +7852,7 @@
             </p:nvSpPr>
             <p:spPr>
               <a:xfrm>
-                <a:off x="924709" y="5943691"/>
+                <a:off x="1543199" y="5226141"/>
                 <a:ext cx="1874103" cy="276999"/>
               </a:xfrm>
               <a:prstGeom prst="rect">
@@ -6262,10 +7974,10 @@
         <mc:Fallback>
           <p:sp>
             <p:nvSpPr>
-              <p:cNvPr id="197" name="TextBox 196">
+              <p:cNvPr id="37" name="TextBox 36">
                 <a:extLst>
                   <a:ext uri="{FF2B5EF4-FFF2-40B4-BE49-F238E27FC236}">
-                    <a16:creationId xmlns:a16="http://schemas.microsoft.com/office/drawing/2014/main" id="{70E94BAA-91E2-B472-DF9A-C4BCC2932781}"/>
+                    <a16:creationId xmlns:a16="http://schemas.microsoft.com/office/drawing/2014/main" id="{069B0486-ABEA-2391-DEBB-D722F43E1A88}"/>
                   </a:ext>
                 </a:extLst>
               </p:cNvPr>
@@ -6276,16 +7988,16 @@
             </p:nvSpPr>
             <p:spPr>
               <a:xfrm>
-                <a:off x="924709" y="5943691"/>
+                <a:off x="1543199" y="5226141"/>
                 <a:ext cx="1874103" cy="276999"/>
               </a:xfrm>
               <a:prstGeom prst="rect">
                 <a:avLst/>
               </a:prstGeom>
               <a:blipFill>
-                <a:blip r:embed="rId16"/>
+                <a:blip r:embed="rId18"/>
                 <a:stretch>
-                  <a:fillRect r="-651" b="-26667"/>
+                  <a:fillRect r="-649" b="-23913"/>
                 </a:stretch>
               </a:blipFill>
             </p:spPr>
@@ -6308,10 +8020,10 @@
         <mc:Choice xmlns:a14="http://schemas.microsoft.com/office/drawing/2010/main" Requires="a14">
           <p:sp>
             <p:nvSpPr>
-              <p:cNvPr id="198" name="TextBox 197">
+              <p:cNvPr id="38" name="TextBox 37">
                 <a:extLst>
                   <a:ext uri="{FF2B5EF4-FFF2-40B4-BE49-F238E27FC236}">
-                    <a16:creationId xmlns:a16="http://schemas.microsoft.com/office/drawing/2014/main" id="{FFC6A83A-FC2F-96DE-876F-F56C0D02EC84}"/>
+                    <a16:creationId xmlns:a16="http://schemas.microsoft.com/office/drawing/2014/main" id="{E6DC6AEC-63C6-79FD-36E7-37E8DA9A08AA}"/>
                   </a:ext>
                 </a:extLst>
               </p:cNvPr>
@@ -6320,7 +8032,7 @@
             </p:nvSpPr>
             <p:spPr>
               <a:xfrm>
-                <a:off x="3275506" y="5509649"/>
+                <a:off x="3736379" y="4887349"/>
                 <a:ext cx="1278555" cy="276999"/>
               </a:xfrm>
               <a:prstGeom prst="rect">
@@ -6425,10 +8137,10 @@
         <mc:Fallback>
           <p:sp>
             <p:nvSpPr>
-              <p:cNvPr id="198" name="TextBox 197">
+              <p:cNvPr id="38" name="TextBox 37">
                 <a:extLst>
                   <a:ext uri="{FF2B5EF4-FFF2-40B4-BE49-F238E27FC236}">
-                    <a16:creationId xmlns:a16="http://schemas.microsoft.com/office/drawing/2014/main" id="{FFC6A83A-FC2F-96DE-876F-F56C0D02EC84}"/>
+                    <a16:creationId xmlns:a16="http://schemas.microsoft.com/office/drawing/2014/main" id="{E6DC6AEC-63C6-79FD-36E7-37E8DA9A08AA}"/>
                   </a:ext>
                 </a:extLst>
               </p:cNvPr>
@@ -6439,494 +8151,18 @@
             </p:nvSpPr>
             <p:spPr>
               <a:xfrm>
-                <a:off x="3275506" y="5509649"/>
+                <a:off x="3736379" y="4887349"/>
                 <a:ext cx="1278555" cy="276999"/>
               </a:xfrm>
               <a:prstGeom prst="rect">
                 <a:avLst/>
               </a:prstGeom>
               <a:blipFill>
-                <a:blip r:embed="rId17"/>
+                <a:blip r:embed="rId19"/>
                 <a:stretch>
-                  <a:fillRect l="-2381" r="-1429" b="-26667"/>
+                  <a:fillRect l="-2381" r="-952" b="-26667"/>
                 </a:stretch>
               </a:blipFill>
-            </p:spPr>
-            <p:txBody>
-              <a:bodyPr/>
-              <a:lstStyle/>
-              <a:p>
-                <a:r>
-                  <a:rPr lang="en-US">
-                    <a:noFill/>
-                  </a:rPr>
-                  <a:t> </a:t>
-                </a:r>
-              </a:p>
-            </p:txBody>
-          </p:sp>
-        </mc:Fallback>
-      </mc:AlternateContent>
-      <p:sp>
-        <p:nvSpPr>
-          <p:cNvPr id="199" name="Rectangle 198">
-            <a:extLst>
-              <a:ext uri="{FF2B5EF4-FFF2-40B4-BE49-F238E27FC236}">
-                <a16:creationId xmlns:a16="http://schemas.microsoft.com/office/drawing/2014/main" id="{76B62B85-9DF1-0B5F-9DB8-88485CBD0782}"/>
-              </a:ext>
-            </a:extLst>
-          </p:cNvPr>
-          <p:cNvSpPr/>
-          <p:nvPr/>
-        </p:nvSpPr>
-        <p:spPr>
-          <a:xfrm>
-            <a:off x="3675332" y="2103417"/>
-            <a:ext cx="901427" cy="388889"/>
-          </a:xfrm>
-          <a:prstGeom prst="rect">
-            <a:avLst/>
-          </a:prstGeom>
-          <a:noFill/>
-          <a:ln w="38100">
-            <a:noFill/>
-          </a:ln>
-        </p:spPr>
-        <p:style>
-          <a:lnRef idx="2">
-            <a:schemeClr val="accent1">
-              <a:shade val="15000"/>
-            </a:schemeClr>
-          </a:lnRef>
-          <a:fillRef idx="1">
-            <a:schemeClr val="accent1"/>
-          </a:fillRef>
-          <a:effectRef idx="0">
-            <a:schemeClr val="accent1"/>
-          </a:effectRef>
-          <a:fontRef idx="minor">
-            <a:schemeClr val="lt1"/>
-          </a:fontRef>
-        </p:style>
-        <p:txBody>
-          <a:bodyPr rtlCol="0" anchor="ctr"/>
-          <a:lstStyle/>
-          <a:p>
-            <a:pPr algn="ctr"/>
-            <a:endParaRPr lang="en-US"/>
-          </a:p>
-        </p:txBody>
-      </p:sp>
-      <p:sp>
-        <p:nvSpPr>
-          <p:cNvPr id="200" name="Rectangle 199">
-            <a:extLst>
-              <a:ext uri="{FF2B5EF4-FFF2-40B4-BE49-F238E27FC236}">
-                <a16:creationId xmlns:a16="http://schemas.microsoft.com/office/drawing/2014/main" id="{49CED3F2-9CCF-EF0D-B227-BA564795876C}"/>
-              </a:ext>
-            </a:extLst>
-          </p:cNvPr>
-          <p:cNvSpPr/>
-          <p:nvPr/>
-        </p:nvSpPr>
-        <p:spPr>
-          <a:xfrm>
-            <a:off x="5733029" y="3269248"/>
-            <a:ext cx="901427" cy="388889"/>
-          </a:xfrm>
-          <a:prstGeom prst="rect">
-            <a:avLst/>
-          </a:prstGeom>
-          <a:noFill/>
-          <a:ln w="38100">
-            <a:noFill/>
-          </a:ln>
-        </p:spPr>
-        <p:style>
-          <a:lnRef idx="2">
-            <a:schemeClr val="accent1">
-              <a:shade val="15000"/>
-            </a:schemeClr>
-          </a:lnRef>
-          <a:fillRef idx="1">
-            <a:schemeClr val="accent1"/>
-          </a:fillRef>
-          <a:effectRef idx="0">
-            <a:schemeClr val="accent1"/>
-          </a:effectRef>
-          <a:fontRef idx="minor">
-            <a:schemeClr val="lt1"/>
-          </a:fontRef>
-        </p:style>
-        <p:txBody>
-          <a:bodyPr rtlCol="0" anchor="ctr"/>
-          <a:lstStyle/>
-          <a:p>
-            <a:pPr algn="ctr"/>
-            <a:endParaRPr lang="en-US"/>
-          </a:p>
-        </p:txBody>
-      </p:sp>
-      <p:sp>
-        <p:nvSpPr>
-          <p:cNvPr id="201" name="Rectangle 200">
-            <a:extLst>
-              <a:ext uri="{FF2B5EF4-FFF2-40B4-BE49-F238E27FC236}">
-                <a16:creationId xmlns:a16="http://schemas.microsoft.com/office/drawing/2014/main" id="{880FA367-82BA-9BB9-85FC-80293225F633}"/>
-              </a:ext>
-            </a:extLst>
-          </p:cNvPr>
-          <p:cNvSpPr/>
-          <p:nvPr/>
-        </p:nvSpPr>
-        <p:spPr>
-          <a:xfrm>
-            <a:off x="7669075" y="4239184"/>
-            <a:ext cx="901427" cy="388889"/>
-          </a:xfrm>
-          <a:prstGeom prst="rect">
-            <a:avLst/>
-          </a:prstGeom>
-          <a:noFill/>
-          <a:ln w="38100">
-            <a:noFill/>
-          </a:ln>
-        </p:spPr>
-        <p:style>
-          <a:lnRef idx="2">
-            <a:schemeClr val="accent1">
-              <a:shade val="15000"/>
-            </a:schemeClr>
-          </a:lnRef>
-          <a:fillRef idx="1">
-            <a:schemeClr val="accent1"/>
-          </a:fillRef>
-          <a:effectRef idx="0">
-            <a:schemeClr val="accent1"/>
-          </a:effectRef>
-          <a:fontRef idx="minor">
-            <a:schemeClr val="lt1"/>
-          </a:fontRef>
-        </p:style>
-        <p:txBody>
-          <a:bodyPr rtlCol="0" anchor="ctr"/>
-          <a:lstStyle/>
-          <a:p>
-            <a:pPr algn="ctr"/>
-            <a:endParaRPr lang="en-US"/>
-          </a:p>
-        </p:txBody>
-      </p:sp>
-      <p:sp>
-        <p:nvSpPr>
-          <p:cNvPr id="208" name="Rectangle 207">
-            <a:extLst>
-              <a:ext uri="{FF2B5EF4-FFF2-40B4-BE49-F238E27FC236}">
-                <a16:creationId xmlns:a16="http://schemas.microsoft.com/office/drawing/2014/main" id="{3D678F8D-400B-3271-C146-647B4E809DC8}"/>
-              </a:ext>
-            </a:extLst>
-          </p:cNvPr>
-          <p:cNvSpPr/>
-          <p:nvPr/>
-        </p:nvSpPr>
-        <p:spPr>
-          <a:xfrm>
-            <a:off x="451275" y="2497642"/>
-            <a:ext cx="901427" cy="388889"/>
-          </a:xfrm>
-          <a:prstGeom prst="rect">
-            <a:avLst/>
-          </a:prstGeom>
-          <a:noFill/>
-          <a:ln w="38100">
-            <a:noFill/>
-          </a:ln>
-        </p:spPr>
-        <p:style>
-          <a:lnRef idx="2">
-            <a:schemeClr val="accent1">
-              <a:shade val="15000"/>
-            </a:schemeClr>
-          </a:lnRef>
-          <a:fillRef idx="1">
-            <a:schemeClr val="accent1"/>
-          </a:fillRef>
-          <a:effectRef idx="0">
-            <a:schemeClr val="accent1"/>
-          </a:effectRef>
-          <a:fontRef idx="minor">
-            <a:schemeClr val="lt1"/>
-          </a:fontRef>
-        </p:style>
-        <p:txBody>
-          <a:bodyPr rtlCol="0" anchor="ctr"/>
-          <a:lstStyle/>
-          <a:p>
-            <a:pPr algn="ctr"/>
-            <a:endParaRPr lang="en-US"/>
-          </a:p>
-        </p:txBody>
-      </p:sp>
-      <mc:AlternateContent xmlns:mc="http://schemas.openxmlformats.org/markup-compatibility/2006">
-        <mc:Choice xmlns:a14="http://schemas.microsoft.com/office/drawing/2010/main" Requires="a14">
-          <p:sp>
-            <p:nvSpPr>
-              <p:cNvPr id="179" name="Rectangle: Rounded Corners 178">
-                <a:extLst>
-                  <a:ext uri="{FF2B5EF4-FFF2-40B4-BE49-F238E27FC236}">
-                    <a16:creationId xmlns:a16="http://schemas.microsoft.com/office/drawing/2014/main" id="{1A50FE3B-6963-F98A-44AE-CF8425992188}"/>
-                  </a:ext>
-                </a:extLst>
-              </p:cNvPr>
-              <p:cNvSpPr/>
-              <p:nvPr/>
-            </p:nvSpPr>
-            <p:spPr>
-              <a:xfrm>
-                <a:off x="4832166" y="3836798"/>
-                <a:ext cx="1755228" cy="1145628"/>
-              </a:xfrm>
-              <a:prstGeom prst="roundRect">
-                <a:avLst/>
-              </a:prstGeom>
-              <a:noFill/>
-              <a:ln w="38100">
-                <a:solidFill>
-                  <a:schemeClr val="tx1"/>
-                </a:solidFill>
-              </a:ln>
-            </p:spPr>
-            <p:style>
-              <a:lnRef idx="2">
-                <a:schemeClr val="accent1">
-                  <a:shade val="15000"/>
-                </a:schemeClr>
-              </a:lnRef>
-              <a:fillRef idx="1">
-                <a:schemeClr val="accent1"/>
-              </a:fillRef>
-              <a:effectRef idx="0">
-                <a:schemeClr val="accent1"/>
-              </a:effectRef>
-              <a:fontRef idx="minor">
-                <a:schemeClr val="lt1"/>
-              </a:fontRef>
-            </p:style>
-            <p:txBody>
-              <a:bodyPr rtlCol="0" anchor="ctr"/>
-              <a:lstStyle/>
-              <a:p>
-                <a:pPr algn="ctr"/>
-                <a14:m>
-                  <m:oMathPara xmlns:m="http://schemas.openxmlformats.org/officeDocument/2006/math">
-                    <m:oMathParaPr>
-                      <m:jc m:val="centerGroup"/>
-                    </m:oMathParaPr>
-                    <m:oMath xmlns:m="http://schemas.openxmlformats.org/officeDocument/2006/math">
-                      <m:r>
-                        <a:rPr lang="en-US" sz="3200" b="0" i="1" smtClean="0">
-                          <a:solidFill>
-                            <a:schemeClr val="tx1"/>
-                          </a:solidFill>
-                          <a:latin typeface="Cambria Math" panose="02040503050406030204" pitchFamily="18" charset="0"/>
-                        </a:rPr>
-                        <m:t>𝑃</m:t>
-                      </m:r>
-                    </m:oMath>
-                  </m:oMathPara>
-                </a14:m>
-                <a:endParaRPr lang="en-US" sz="3200" dirty="0">
-                  <a:solidFill>
-                    <a:schemeClr val="tx1"/>
-                  </a:solidFill>
-                </a:endParaRPr>
-              </a:p>
-              <a:p>
-                <a:pPr algn="ctr"/>
-                <a:r>
-                  <a:rPr lang="en-US" sz="1600" dirty="0">
-                    <a:solidFill>
-                      <a:schemeClr val="tx1"/>
-                    </a:solidFill>
-                  </a:rPr>
-                  <a:t>Probing</a:t>
-                </a:r>
-              </a:p>
-            </p:txBody>
-          </p:sp>
-        </mc:Choice>
-        <mc:Fallback>
-          <p:sp>
-            <p:nvSpPr>
-              <p:cNvPr id="179" name="Rectangle: Rounded Corners 178">
-                <a:extLst>
-                  <a:ext uri="{FF2B5EF4-FFF2-40B4-BE49-F238E27FC236}">
-                    <a16:creationId xmlns:a16="http://schemas.microsoft.com/office/drawing/2014/main" id="{1A50FE3B-6963-F98A-44AE-CF8425992188}"/>
-                  </a:ext>
-                </a:extLst>
-              </p:cNvPr>
-              <p:cNvSpPr>
-                <a:spLocks noRot="1" noChangeAspect="1" noMove="1" noResize="1" noEditPoints="1" noAdjustHandles="1" noChangeArrowheads="1" noChangeShapeType="1" noTextEdit="1"/>
-              </p:cNvSpPr>
-              <p:nvPr/>
-            </p:nvSpPr>
-            <p:spPr>
-              <a:xfrm>
-                <a:off x="4832166" y="3836798"/>
-                <a:ext cx="1755228" cy="1145628"/>
-              </a:xfrm>
-              <a:prstGeom prst="roundRect">
-                <a:avLst/>
-              </a:prstGeom>
-              <a:blipFill>
-                <a:blip r:embed="rId18"/>
-                <a:stretch>
-                  <a:fillRect/>
-                </a:stretch>
-              </a:blipFill>
-              <a:ln w="38100">
-                <a:solidFill>
-                  <a:schemeClr val="tx1"/>
-                </a:solidFill>
-              </a:ln>
-            </p:spPr>
-            <p:txBody>
-              <a:bodyPr/>
-              <a:lstStyle/>
-              <a:p>
-                <a:r>
-                  <a:rPr lang="en-US">
-                    <a:noFill/>
-                  </a:rPr>
-                  <a:t> </a:t>
-                </a:r>
-              </a:p>
-            </p:txBody>
-          </p:sp>
-        </mc:Fallback>
-      </mc:AlternateContent>
-      <mc:AlternateContent xmlns:mc="http://schemas.openxmlformats.org/markup-compatibility/2006">
-        <mc:Choice xmlns:a14="http://schemas.microsoft.com/office/drawing/2010/main" Requires="a14">
-          <p:sp>
-            <p:nvSpPr>
-              <p:cNvPr id="180" name="Rectangle: Rounded Corners 179">
-                <a:extLst>
-                  <a:ext uri="{FF2B5EF4-FFF2-40B4-BE49-F238E27FC236}">
-                    <a16:creationId xmlns:a16="http://schemas.microsoft.com/office/drawing/2014/main" id="{80C6AC45-CCDB-EC7A-D9DE-E1017BD59E95}"/>
-                  </a:ext>
-                </a:extLst>
-              </p:cNvPr>
-              <p:cNvSpPr/>
-              <p:nvPr/>
-            </p:nvSpPr>
-            <p:spPr>
-              <a:xfrm>
-                <a:off x="6791753" y="4882618"/>
-                <a:ext cx="1755228" cy="1145628"/>
-              </a:xfrm>
-              <a:prstGeom prst="roundRect">
-                <a:avLst/>
-              </a:prstGeom>
-              <a:noFill/>
-              <a:ln w="38100">
-                <a:solidFill>
-                  <a:schemeClr val="tx1"/>
-                </a:solidFill>
-              </a:ln>
-            </p:spPr>
-            <p:style>
-              <a:lnRef idx="2">
-                <a:schemeClr val="accent1">
-                  <a:shade val="15000"/>
-                </a:schemeClr>
-              </a:lnRef>
-              <a:fillRef idx="1">
-                <a:schemeClr val="accent1"/>
-              </a:fillRef>
-              <a:effectRef idx="0">
-                <a:schemeClr val="accent1"/>
-              </a:effectRef>
-              <a:fontRef idx="minor">
-                <a:schemeClr val="lt1"/>
-              </a:fontRef>
-            </p:style>
-            <p:txBody>
-              <a:bodyPr rtlCol="0" anchor="ctr"/>
-              <a:lstStyle/>
-              <a:p>
-                <a:pPr algn="ctr"/>
-                <a14:m>
-                  <m:oMathPara xmlns:m="http://schemas.openxmlformats.org/officeDocument/2006/math">
-                    <m:oMathParaPr>
-                      <m:jc m:val="centerGroup"/>
-                    </m:oMathParaPr>
-                    <m:oMath xmlns:m="http://schemas.openxmlformats.org/officeDocument/2006/math">
-                      <m:r>
-                        <a:rPr lang="en-US" sz="3200" b="0" i="1" smtClean="0">
-                          <a:solidFill>
-                            <a:schemeClr val="tx1"/>
-                          </a:solidFill>
-                          <a:latin typeface="Cambria Math" panose="02040503050406030204" pitchFamily="18" charset="0"/>
-                        </a:rPr>
-                        <m:t>𝐺</m:t>
-                      </m:r>
-                    </m:oMath>
-                  </m:oMathPara>
-                </a14:m>
-                <a:endParaRPr lang="en-US" sz="3200" dirty="0">
-                  <a:solidFill>
-                    <a:schemeClr val="tx1"/>
-                  </a:solidFill>
-                </a:endParaRPr>
-              </a:p>
-              <a:p>
-                <a:pPr algn="ctr"/>
-                <a:r>
-                  <a:rPr lang="en-US" sz="1600" dirty="0">
-                    <a:solidFill>
-                      <a:schemeClr val="tx1"/>
-                    </a:solidFill>
-                  </a:rPr>
-                  <a:t>Ingesting</a:t>
-                </a:r>
-              </a:p>
-            </p:txBody>
-          </p:sp>
-        </mc:Choice>
-        <mc:Fallback>
-          <p:sp>
-            <p:nvSpPr>
-              <p:cNvPr id="180" name="Rectangle: Rounded Corners 179">
-                <a:extLst>
-                  <a:ext uri="{FF2B5EF4-FFF2-40B4-BE49-F238E27FC236}">
-                    <a16:creationId xmlns:a16="http://schemas.microsoft.com/office/drawing/2014/main" id="{80C6AC45-CCDB-EC7A-D9DE-E1017BD59E95}"/>
-                  </a:ext>
-                </a:extLst>
-              </p:cNvPr>
-              <p:cNvSpPr>
-                <a:spLocks noRot="1" noChangeAspect="1" noMove="1" noResize="1" noEditPoints="1" noAdjustHandles="1" noChangeArrowheads="1" noChangeShapeType="1" noTextEdit="1"/>
-              </p:cNvSpPr>
-              <p:nvPr/>
-            </p:nvSpPr>
-            <p:spPr>
-              <a:xfrm>
-                <a:off x="6791753" y="4882618"/>
-                <a:ext cx="1755228" cy="1145628"/>
-              </a:xfrm>
-              <a:prstGeom prst="roundRect">
-                <a:avLst/>
-              </a:prstGeom>
-              <a:blipFill>
-                <a:blip r:embed="rId19"/>
-                <a:stretch>
-                  <a:fillRect/>
-                </a:stretch>
-              </a:blipFill>
-              <a:ln w="38100">
-                <a:solidFill>
-                  <a:schemeClr val="tx1"/>
-                </a:solidFill>
-              </a:ln>
             </p:spPr>
             <p:txBody>
               <a:bodyPr/>
@@ -6946,7 +8182,7 @@
     </p:spTree>
     <p:extLst>
       <p:ext uri="{BB962C8B-B14F-4D97-AF65-F5344CB8AC3E}">
-        <p14:creationId xmlns:p14="http://schemas.microsoft.com/office/powerpoint/2010/main" val="252422778"/>
+        <p14:creationId xmlns:p14="http://schemas.microsoft.com/office/powerpoint/2010/main" val="1490602791"/>
       </p:ext>
     </p:extLst>
   </p:cSld>

</xml_diff>